<commit_message>
modify presentation of Lab 3
</commit_message>
<xml_diff>
--- a/實驗三/presentation/實驗三_第二組_葉彥辰_郭亮佑_蘇昱嘉.pptx
+++ b/實驗三/presentation/實驗三_第二組_葉彥辰_郭亮佑_蘇昱嘉.pptx
@@ -5,23 +5,30 @@
     <p:sldMasterId id="2147483660" r:id="rId1"/>
   </p:sldMasterIdLst>
   <p:notesMasterIdLst>
-    <p:notesMasterId r:id="rId16"/>
+    <p:notesMasterId r:id="rId23"/>
   </p:notesMasterIdLst>
   <p:sldIdLst>
     <p:sldId id="256" r:id="rId2"/>
     <p:sldId id="257" r:id="rId3"/>
-    <p:sldId id="303" r:id="rId4"/>
-    <p:sldId id="305" r:id="rId5"/>
-    <p:sldId id="306" r:id="rId6"/>
-    <p:sldId id="307" r:id="rId7"/>
-    <p:sldId id="309" r:id="rId8"/>
-    <p:sldId id="308" r:id="rId9"/>
-    <p:sldId id="310" r:id="rId10"/>
-    <p:sldId id="311" r:id="rId11"/>
-    <p:sldId id="302" r:id="rId12"/>
-    <p:sldId id="284" r:id="rId13"/>
-    <p:sldId id="312" r:id="rId14"/>
-    <p:sldId id="313" r:id="rId15"/>
+    <p:sldId id="314" r:id="rId4"/>
+    <p:sldId id="258" r:id="rId5"/>
+    <p:sldId id="303" r:id="rId6"/>
+    <p:sldId id="305" r:id="rId7"/>
+    <p:sldId id="306" r:id="rId8"/>
+    <p:sldId id="307" r:id="rId9"/>
+    <p:sldId id="309" r:id="rId10"/>
+    <p:sldId id="308" r:id="rId11"/>
+    <p:sldId id="260" r:id="rId12"/>
+    <p:sldId id="310" r:id="rId13"/>
+    <p:sldId id="261" r:id="rId14"/>
+    <p:sldId id="311" r:id="rId15"/>
+    <p:sldId id="262" r:id="rId16"/>
+    <p:sldId id="302" r:id="rId17"/>
+    <p:sldId id="284" r:id="rId18"/>
+    <p:sldId id="312" r:id="rId19"/>
+    <p:sldId id="316" r:id="rId20"/>
+    <p:sldId id="317" r:id="rId21"/>
+    <p:sldId id="313" r:id="rId22"/>
   </p:sldIdLst>
   <p:sldSz cx="12192000" cy="6858000"/>
   <p:notesSz cx="6858000" cy="9144000"/>
@@ -497,7 +504,7 @@
           <a:p>
             <a:fld id="{57D05ABF-D590-45D6-9362-AC05D4E152AF}" type="datetimeFigureOut">
               <a:rPr lang="zh-TW" altLang="en-US" smtClean="0"/>
-              <a:t>2025/3/15</a:t>
+              <a:t>2025/3/17</a:t>
             </a:fld>
             <a:endParaRPr lang="zh-TW" altLang="en-US"/>
           </a:p>
@@ -911,7 +918,7 @@
           <a:p>
             <a:fld id="{A6CAA258-0090-479D-81AE-6C5E423E63D8}" type="datetimeFigureOut">
               <a:rPr lang="zh-TW" altLang="en-US" smtClean="0"/>
-              <a:t>2025/3/15</a:t>
+              <a:t>2025/3/17</a:t>
             </a:fld>
             <a:endParaRPr lang="zh-TW" altLang="en-US"/>
           </a:p>
@@ -1109,7 +1116,7 @@
           <a:p>
             <a:fld id="{A6CAA258-0090-479D-81AE-6C5E423E63D8}" type="datetimeFigureOut">
               <a:rPr lang="zh-TW" altLang="en-US" smtClean="0"/>
-              <a:t>2025/3/15</a:t>
+              <a:t>2025/3/17</a:t>
             </a:fld>
             <a:endParaRPr lang="zh-TW" altLang="en-US"/>
           </a:p>
@@ -1317,7 +1324,7 @@
           <a:p>
             <a:fld id="{A6CAA258-0090-479D-81AE-6C5E423E63D8}" type="datetimeFigureOut">
               <a:rPr lang="zh-TW" altLang="en-US" smtClean="0"/>
-              <a:t>2025/3/15</a:t>
+              <a:t>2025/3/17</a:t>
             </a:fld>
             <a:endParaRPr lang="zh-TW" altLang="en-US"/>
           </a:p>
@@ -1515,7 +1522,7 @@
           <a:p>
             <a:fld id="{A6CAA258-0090-479D-81AE-6C5E423E63D8}" type="datetimeFigureOut">
               <a:rPr lang="zh-TW" altLang="en-US" smtClean="0"/>
-              <a:t>2025/3/15</a:t>
+              <a:t>2025/3/17</a:t>
             </a:fld>
             <a:endParaRPr lang="zh-TW" altLang="en-US"/>
           </a:p>
@@ -1790,7 +1797,7 @@
           <a:p>
             <a:fld id="{A6CAA258-0090-479D-81AE-6C5E423E63D8}" type="datetimeFigureOut">
               <a:rPr lang="zh-TW" altLang="en-US" smtClean="0"/>
-              <a:t>2025/3/15</a:t>
+              <a:t>2025/3/17</a:t>
             </a:fld>
             <a:endParaRPr lang="zh-TW" altLang="en-US"/>
           </a:p>
@@ -2055,7 +2062,7 @@
           <a:p>
             <a:fld id="{A6CAA258-0090-479D-81AE-6C5E423E63D8}" type="datetimeFigureOut">
               <a:rPr lang="zh-TW" altLang="en-US" smtClean="0"/>
-              <a:t>2025/3/15</a:t>
+              <a:t>2025/3/17</a:t>
             </a:fld>
             <a:endParaRPr lang="zh-TW" altLang="en-US"/>
           </a:p>
@@ -2467,7 +2474,7 @@
           <a:p>
             <a:fld id="{A6CAA258-0090-479D-81AE-6C5E423E63D8}" type="datetimeFigureOut">
               <a:rPr lang="zh-TW" altLang="en-US" smtClean="0"/>
-              <a:t>2025/3/15</a:t>
+              <a:t>2025/3/17</a:t>
             </a:fld>
             <a:endParaRPr lang="zh-TW" altLang="en-US"/>
           </a:p>
@@ -2608,7 +2615,7 @@
           <a:p>
             <a:fld id="{A6CAA258-0090-479D-81AE-6C5E423E63D8}" type="datetimeFigureOut">
               <a:rPr lang="zh-TW" altLang="en-US" smtClean="0"/>
-              <a:t>2025/3/15</a:t>
+              <a:t>2025/3/17</a:t>
             </a:fld>
             <a:endParaRPr lang="zh-TW" altLang="en-US"/>
           </a:p>
@@ -2721,7 +2728,7 @@
           <a:p>
             <a:fld id="{A6CAA258-0090-479D-81AE-6C5E423E63D8}" type="datetimeFigureOut">
               <a:rPr lang="zh-TW" altLang="en-US" smtClean="0"/>
-              <a:t>2025/3/15</a:t>
+              <a:t>2025/3/17</a:t>
             </a:fld>
             <a:endParaRPr lang="zh-TW" altLang="en-US"/>
           </a:p>
@@ -3032,7 +3039,7 @@
           <a:p>
             <a:fld id="{A6CAA258-0090-479D-81AE-6C5E423E63D8}" type="datetimeFigureOut">
               <a:rPr lang="zh-TW" altLang="en-US" smtClean="0"/>
-              <a:t>2025/3/15</a:t>
+              <a:t>2025/3/17</a:t>
             </a:fld>
             <a:endParaRPr lang="zh-TW" altLang="en-US"/>
           </a:p>
@@ -3320,7 +3327,7 @@
           <a:p>
             <a:fld id="{A6CAA258-0090-479D-81AE-6C5E423E63D8}" type="datetimeFigureOut">
               <a:rPr lang="zh-TW" altLang="en-US" smtClean="0"/>
-              <a:t>2025/3/15</a:t>
+              <a:t>2025/3/17</a:t>
             </a:fld>
             <a:endParaRPr lang="zh-TW" altLang="en-US"/>
           </a:p>
@@ -3561,7 +3568,7 @@
           <a:p>
             <a:fld id="{A6CAA258-0090-479D-81AE-6C5E423E63D8}" type="datetimeFigureOut">
               <a:rPr lang="zh-TW" altLang="en-US" smtClean="0"/>
-              <a:t>2025/3/15</a:t>
+              <a:t>2025/3/17</a:t>
             </a:fld>
             <a:endParaRPr lang="zh-TW" altLang="en-US"/>
           </a:p>
@@ -3994,10 +4001,9 @@
           <a:lstStyle/>
           <a:p>
             <a:r>
-              <a:rPr lang="zh-TW" altLang="en-US" dirty="0" smtClean="0"/>
+              <a:rPr lang="zh-TW" altLang="en-US" dirty="0"/>
               <a:t>實驗三</a:t>
             </a:r>
-            <a:endParaRPr lang="zh-TW" altLang="en-US" dirty="0"/>
           </a:p>
         </p:txBody>
       </p:sp>
@@ -4077,18 +4083,1356 @@
           <a:lstStyle/>
           <a:p>
             <a:r>
-              <a:rPr lang="zh-TW" altLang="en-US" dirty="0" smtClean="0">
+              <a:rPr lang="zh-TW" altLang="en-US" dirty="0">
                 <a:latin typeface="標楷體" panose="03000509000000000000" pitchFamily="65" charset="-120"/>
                 <a:ea typeface="標楷體" panose="03000509000000000000" pitchFamily="65" charset="-120"/>
               </a:rPr>
               <a:t>實驗</a:t>
             </a:r>
             <a:r>
-              <a:rPr lang="en-US" altLang="zh-TW" dirty="0" smtClean="0">
+              <a:rPr lang="en-US" altLang="zh-TW" dirty="0">
                 <a:latin typeface="標楷體" panose="03000509000000000000" pitchFamily="65" charset="-120"/>
                 <a:ea typeface="標楷體" panose="03000509000000000000" pitchFamily="65" charset="-120"/>
               </a:rPr>
-              <a:t>2-2</a:t>
+              <a:t>3-2</a:t>
+            </a:r>
+            <a:endParaRPr lang="zh-TW" altLang="en-US" dirty="0">
+              <a:latin typeface="標楷體" panose="03000509000000000000" pitchFamily="65" charset="-120"/>
+              <a:ea typeface="標楷體" panose="03000509000000000000" pitchFamily="65" charset="-120"/>
+            </a:endParaRPr>
+          </a:p>
+        </p:txBody>
+      </p:sp>
+      <p:pic>
+        <p:nvPicPr>
+          <p:cNvPr id="3" name="圖片 2"/>
+          <p:cNvPicPr>
+            <a:picLocks noChangeAspect="1"/>
+          </p:cNvPicPr>
+          <p:nvPr/>
+        </p:nvPicPr>
+        <p:blipFill>
+          <a:blip r:embed="rId2"/>
+          <a:stretch>
+            <a:fillRect/>
+          </a:stretch>
+        </p:blipFill>
+        <p:spPr>
+          <a:xfrm>
+            <a:off x="838200" y="1553827"/>
+            <a:ext cx="10702840" cy="737753"/>
+          </a:xfrm>
+          <a:prstGeom prst="rect">
+            <a:avLst/>
+          </a:prstGeom>
+        </p:spPr>
+      </p:pic>
+      <p:pic>
+        <p:nvPicPr>
+          <p:cNvPr id="4" name="圖片 3"/>
+          <p:cNvPicPr>
+            <a:picLocks noChangeAspect="1"/>
+          </p:cNvPicPr>
+          <p:nvPr/>
+        </p:nvPicPr>
+        <p:blipFill>
+          <a:blip r:embed="rId3" cstate="print">
+            <a:extLst>
+              <a:ext uri="{28A0092B-C50C-407E-A947-70E740481C1C}">
+                <a14:useLocalDpi xmlns:a14="http://schemas.microsoft.com/office/drawing/2010/main" val="0"/>
+              </a:ext>
+            </a:extLst>
+          </a:blip>
+          <a:stretch>
+            <a:fillRect/>
+          </a:stretch>
+        </p:blipFill>
+        <p:spPr>
+          <a:xfrm>
+            <a:off x="1421318" y="3180282"/>
+            <a:ext cx="3135429" cy="2887579"/>
+          </a:xfrm>
+          <a:prstGeom prst="rect">
+            <a:avLst/>
+          </a:prstGeom>
+        </p:spPr>
+      </p:pic>
+      <p:pic>
+        <p:nvPicPr>
+          <p:cNvPr id="5" name="圖片 4"/>
+          <p:cNvPicPr>
+            <a:picLocks noChangeAspect="1"/>
+          </p:cNvPicPr>
+          <p:nvPr/>
+        </p:nvPicPr>
+        <p:blipFill>
+          <a:blip r:embed="rId4" cstate="print">
+            <a:extLst>
+              <a:ext uri="{28A0092B-C50C-407E-A947-70E740481C1C}">
+                <a14:useLocalDpi xmlns:a14="http://schemas.microsoft.com/office/drawing/2010/main" val="0"/>
+              </a:ext>
+            </a:extLst>
+          </a:blip>
+          <a:stretch>
+            <a:fillRect/>
+          </a:stretch>
+        </p:blipFill>
+        <p:spPr>
+          <a:xfrm>
+            <a:off x="8405611" y="3180282"/>
+            <a:ext cx="3135429" cy="2887579"/>
+          </a:xfrm>
+          <a:prstGeom prst="rect">
+            <a:avLst/>
+          </a:prstGeom>
+        </p:spPr>
+      </p:pic>
+      <p:pic>
+        <p:nvPicPr>
+          <p:cNvPr id="6" name="圖片 5"/>
+          <p:cNvPicPr>
+            <a:picLocks noChangeAspect="1"/>
+          </p:cNvPicPr>
+          <p:nvPr/>
+        </p:nvPicPr>
+        <p:blipFill>
+          <a:blip r:embed="rId5" cstate="print">
+            <a:extLst>
+              <a:ext uri="{28A0092B-C50C-407E-A947-70E740481C1C}">
+                <a14:useLocalDpi xmlns:a14="http://schemas.microsoft.com/office/drawing/2010/main" val="0"/>
+              </a:ext>
+            </a:extLst>
+          </a:blip>
+          <a:stretch>
+            <a:fillRect/>
+          </a:stretch>
+        </p:blipFill>
+        <p:spPr>
+          <a:xfrm>
+            <a:off x="4969826" y="3180282"/>
+            <a:ext cx="3135429" cy="2887579"/>
+          </a:xfrm>
+          <a:prstGeom prst="rect">
+            <a:avLst/>
+          </a:prstGeom>
+        </p:spPr>
+      </p:pic>
+    </p:spTree>
+    <p:extLst>
+      <p:ext uri="{BB962C8B-B14F-4D97-AF65-F5344CB8AC3E}">
+        <p14:creationId xmlns:p14="http://schemas.microsoft.com/office/powerpoint/2010/main" val="1966546450"/>
+      </p:ext>
+    </p:extLst>
+  </p:cSld>
+  <p:clrMapOvr>
+    <a:masterClrMapping/>
+  </p:clrMapOvr>
+</p:sld>
+</file>
+
+<file path=ppt/slides/slide11.xml><?xml version="1.0" encoding="utf-8"?>
+<p:sld xmlns:a="http://schemas.openxmlformats.org/drawingml/2006/main" xmlns:r="http://schemas.openxmlformats.org/officeDocument/2006/relationships" xmlns:p="http://schemas.openxmlformats.org/presentationml/2006/main">
+  <p:cSld>
+    <p:spTree>
+      <p:nvGrpSpPr>
+        <p:cNvPr id="1" name=""/>
+        <p:cNvGrpSpPr/>
+        <p:nvPr/>
+      </p:nvGrpSpPr>
+      <p:grpSpPr>
+        <a:xfrm>
+          <a:off x="0" y="0"/>
+          <a:ext cx="0" cy="0"/>
+          <a:chOff x="0" y="0"/>
+          <a:chExt cx="0" cy="0"/>
+        </a:xfrm>
+      </p:grpSpPr>
+      <p:sp>
+        <p:nvSpPr>
+          <p:cNvPr id="3" name="TextBox 2"/>
+          <p:cNvSpPr txBox="1"/>
+          <p:nvPr/>
+        </p:nvSpPr>
+        <p:spPr>
+          <a:xfrm>
+            <a:off x="4387840" y="192820"/>
+            <a:ext cx="3416320" cy="461665"/>
+          </a:xfrm>
+          <a:prstGeom prst="rect">
+            <a:avLst/>
+          </a:prstGeom>
+          <a:noFill/>
+        </p:spPr>
+        <p:txBody>
+          <a:bodyPr wrap="none">
+            <a:spAutoFit/>
+          </a:bodyPr>
+          <a:lstStyle/>
+          <a:p>
+            <a:pPr algn="ctr">
+              <a:defRPr sz="2400">
+                <a:latin typeface="標楷體"/>
+              </a:defRPr>
+            </a:pPr>
+            <a:r>
+              <a:rPr lang="zh-TW" altLang="en-US" sz="2400" dirty="0"/>
+              <a:t>表 </a:t>
+            </a:r>
+            <a:r>
+              <a:rPr lang="en-US" altLang="zh-TW" sz="2400" dirty="0"/>
+              <a:t>3-5</a:t>
+            </a:r>
+            <a:r>
+              <a:rPr lang="zh-TW" altLang="en-US" sz="2400" dirty="0"/>
+              <a:t>、</a:t>
+            </a:r>
+            <a:r>
+              <a:rPr lang="en-US" altLang="zh-TW" sz="2400" dirty="0"/>
+              <a:t>P1 </a:t>
+            </a:r>
+            <a:r>
+              <a:rPr lang="zh-TW" altLang="en-US" sz="2400" dirty="0"/>
+              <a:t>調整至 </a:t>
+            </a:r>
+            <a:r>
+              <a:rPr lang="en-US" altLang="zh-TW" sz="2400" dirty="0"/>
+              <a:t>25%</a:t>
+            </a:r>
+          </a:p>
+        </p:txBody>
+      </p:sp>
+      <p:graphicFrame>
+        <p:nvGraphicFramePr>
+          <p:cNvPr id="4" name="Table 3"/>
+          <p:cNvGraphicFramePr>
+            <a:graphicFrameLocks noGrp="1"/>
+          </p:cNvGraphicFramePr>
+          <p:nvPr>
+            <p:extLst>
+              <p:ext uri="{D42A27DB-BD31-4B8C-83A1-F6EECF244321}">
+                <p14:modId xmlns:p14="http://schemas.microsoft.com/office/powerpoint/2010/main" val="3559228181"/>
+              </p:ext>
+            </p:extLst>
+          </p:nvPr>
+        </p:nvGraphicFramePr>
+        <p:xfrm>
+          <a:off x="2448338" y="987950"/>
+          <a:ext cx="8229600" cy="2042160"/>
+        </p:xfrm>
+        <a:graphic>
+          <a:graphicData uri="http://schemas.openxmlformats.org/drawingml/2006/table">
+            <a:tbl>
+              <a:tblPr firstRow="1" bandRow="1">
+                <a:tableStyleId>{00A15C55-8517-42AA-B614-E9B94910E393}</a:tableStyleId>
+              </a:tblPr>
+              <a:tblGrid>
+                <a:gridCol w="1371600">
+                  <a:extLst>
+                    <a:ext uri="{9D8B030D-6E8A-4147-A177-3AD203B41FA5}">
+                      <a16:colId xmlns:a16="http://schemas.microsoft.com/office/drawing/2014/main" val="20000"/>
+                    </a:ext>
+                  </a:extLst>
+                </a:gridCol>
+                <a:gridCol w="1371600">
+                  <a:extLst>
+                    <a:ext uri="{9D8B030D-6E8A-4147-A177-3AD203B41FA5}">
+                      <a16:colId xmlns:a16="http://schemas.microsoft.com/office/drawing/2014/main" val="20001"/>
+                    </a:ext>
+                  </a:extLst>
+                </a:gridCol>
+                <a:gridCol w="1371600">
+                  <a:extLst>
+                    <a:ext uri="{9D8B030D-6E8A-4147-A177-3AD203B41FA5}">
+                      <a16:colId xmlns:a16="http://schemas.microsoft.com/office/drawing/2014/main" val="20002"/>
+                    </a:ext>
+                  </a:extLst>
+                </a:gridCol>
+                <a:gridCol w="1371600">
+                  <a:extLst>
+                    <a:ext uri="{9D8B030D-6E8A-4147-A177-3AD203B41FA5}">
+                      <a16:colId xmlns:a16="http://schemas.microsoft.com/office/drawing/2014/main" val="20003"/>
+                    </a:ext>
+                  </a:extLst>
+                </a:gridCol>
+                <a:gridCol w="1371600">
+                  <a:extLst>
+                    <a:ext uri="{9D8B030D-6E8A-4147-A177-3AD203B41FA5}">
+                      <a16:colId xmlns:a16="http://schemas.microsoft.com/office/drawing/2014/main" val="20004"/>
+                    </a:ext>
+                  </a:extLst>
+                </a:gridCol>
+                <a:gridCol w="1371600">
+                  <a:extLst>
+                    <a:ext uri="{9D8B030D-6E8A-4147-A177-3AD203B41FA5}">
+                      <a16:colId xmlns:a16="http://schemas.microsoft.com/office/drawing/2014/main" val="20005"/>
+                    </a:ext>
+                  </a:extLst>
+                </a:gridCol>
+              </a:tblGrid>
+              <a:tr h="609600">
+                <a:tc>
+                  <a:txBody>
+                    <a:bodyPr/>
+                    <a:lstStyle/>
+                    <a:p>
+                      <a:pPr algn="ctr"/>
+                      <a:r>
+                        <a:rPr sz="1600" b="1"/>
+                        <a:t>項目</a:t>
+                      </a:r>
+                      <a:endParaRPr sz="1600" b="1">
+                        <a:latin typeface="標楷體"/>
+                      </a:endParaRPr>
+                    </a:p>
+                  </a:txBody>
+                  <a:tcPr/>
+                </a:tc>
+                <a:tc>
+                  <a:txBody>
+                    <a:bodyPr/>
+                    <a:lstStyle/>
+                    <a:p>
+                      <a:pPr algn="ctr"/>
+                      <a:r>
+                        <a:rPr sz="1600" b="1" dirty="0" err="1"/>
+                        <a:t>輸入信號</a:t>
+                      </a:r>
+                      <a:r>
+                        <a:rPr sz="1600" b="1" dirty="0"/>
+                        <a:t>
+</a:t>
+                      </a:r>
+                      <a:r>
+                        <a:rPr sz="1600" b="1" dirty="0" err="1"/>
+                        <a:t>Ea</a:t>
+                      </a:r>
+                      <a:r>
+                        <a:rPr sz="1600" b="1" dirty="0"/>
+                        <a:t>(V)</a:t>
+                      </a:r>
+                      <a:endParaRPr sz="1600" b="1" dirty="0">
+                        <a:latin typeface="標楷體"/>
+                      </a:endParaRPr>
+                    </a:p>
+                  </a:txBody>
+                  <a:tcPr/>
+                </a:tc>
+                <a:tc>
+                  <a:txBody>
+                    <a:bodyPr/>
+                    <a:lstStyle/>
+                    <a:p>
+                      <a:pPr algn="ctr"/>
+                      <a:r>
+                        <a:rPr sz="1600" b="1"/>
+                        <a:t>響應穩態值
+ωss(V)</a:t>
+                      </a:r>
+                      <a:endParaRPr sz="1600" b="1">
+                        <a:latin typeface="標楷體"/>
+                      </a:endParaRPr>
+                    </a:p>
+                  </a:txBody>
+                  <a:tcPr/>
+                </a:tc>
+                <a:tc>
+                  <a:txBody>
+                    <a:bodyPr/>
+                    <a:lstStyle/>
+                    <a:p>
+                      <a:pPr algn="ctr"/>
+                      <a:r>
+                        <a:rPr sz="1600" b="1" dirty="0" err="1"/>
+                        <a:t>增益</a:t>
+                      </a:r>
+                      <a:r>
+                        <a:rPr sz="1600" b="1" dirty="0"/>
+                        <a:t>
+</a:t>
+                      </a:r>
+                      <a:r>
+                        <a:rPr sz="1600" b="1" dirty="0" err="1"/>
+                        <a:t>ωss</a:t>
+                      </a:r>
+                      <a:r>
+                        <a:rPr sz="1600" b="1" dirty="0"/>
+                        <a:t>(V)/</a:t>
+                      </a:r>
+                      <a:r>
+                        <a:rPr sz="1600" b="1" dirty="0" err="1"/>
+                        <a:t>Ea</a:t>
+                      </a:r>
+                      <a:r>
+                        <a:rPr sz="1600" b="1" dirty="0"/>
+                        <a:t>(V)</a:t>
+                      </a:r>
+                      <a:endParaRPr sz="1600" b="1" dirty="0">
+                        <a:latin typeface="標楷體"/>
+                      </a:endParaRPr>
+                    </a:p>
+                  </a:txBody>
+                  <a:tcPr/>
+                </a:tc>
+                <a:tc>
+                  <a:txBody>
+                    <a:bodyPr/>
+                    <a:lstStyle/>
+                    <a:p>
+                      <a:pPr algn="ctr"/>
+                      <a:r>
+                        <a:rPr sz="1600" b="1" dirty="0" err="1"/>
+                        <a:t>步階響應值</a:t>
+                      </a:r>
+                      <a:r>
+                        <a:rPr sz="1600" b="1" dirty="0"/>
+                        <a:t>
+0.632*</a:t>
+                      </a:r>
+                      <a:r>
+                        <a:rPr sz="1600" b="1" dirty="0" err="1"/>
+                        <a:t>ωss</a:t>
+                      </a:r>
+                      <a:r>
+                        <a:rPr sz="1600" b="1" dirty="0"/>
+                        <a:t>(V)</a:t>
+                      </a:r>
+                      <a:endParaRPr sz="1600" b="1" dirty="0">
+                        <a:latin typeface="標楷體"/>
+                      </a:endParaRPr>
+                    </a:p>
+                  </a:txBody>
+                  <a:tcPr/>
+                </a:tc>
+                <a:tc>
+                  <a:txBody>
+                    <a:bodyPr/>
+                    <a:lstStyle/>
+                    <a:p>
+                      <a:pPr algn="ctr"/>
+                      <a:r>
+                        <a:rPr sz="1600" b="1"/>
+                        <a:t>時間常數
+τv</a:t>
+                      </a:r>
+                      <a:endParaRPr sz="1600" b="1">
+                        <a:latin typeface="標楷體"/>
+                      </a:endParaRPr>
+                    </a:p>
+                  </a:txBody>
+                  <a:tcPr/>
+                </a:tc>
+                <a:extLst>
+                  <a:ext uri="{0D108BD9-81ED-4DB2-BD59-A6C34878D82A}">
+                    <a16:rowId xmlns:a16="http://schemas.microsoft.com/office/drawing/2014/main" val="10000"/>
+                  </a:ext>
+                </a:extLst>
+              </a:tr>
+              <a:tr h="609600">
+                <a:tc>
+                  <a:txBody>
+                    <a:bodyPr/>
+                    <a:lstStyle/>
+                    <a:p>
+                      <a:pPr algn="ctr"/>
+                      <a:r>
+                        <a:rPr sz="1600"/>
+                        <a:t>實驗</a:t>
+                      </a:r>
+                      <a:endParaRPr sz="1600">
+                        <a:latin typeface="標楷體"/>
+                      </a:endParaRPr>
+                    </a:p>
+                  </a:txBody>
+                  <a:tcPr/>
+                </a:tc>
+                <a:tc>
+                  <a:txBody>
+                    <a:bodyPr/>
+                    <a:lstStyle/>
+                    <a:p>
+                      <a:pPr algn="ctr"/>
+                      <a:r>
+                        <a:rPr lang="en-US" altLang="zh-TW" dirty="0"/>
+                        <a:t>6.01</a:t>
+                      </a:r>
+                      <a:endParaRPr dirty="0"/>
+                    </a:p>
+                  </a:txBody>
+                  <a:tcPr/>
+                </a:tc>
+                <a:tc>
+                  <a:txBody>
+                    <a:bodyPr/>
+                    <a:lstStyle/>
+                    <a:p>
+                      <a:pPr algn="ctr"/>
+                      <a:r>
+                        <a:rPr lang="en-US" altLang="zh-TW" dirty="0"/>
+                        <a:t>2.3</a:t>
+                      </a:r>
+                      <a:endParaRPr dirty="0"/>
+                    </a:p>
+                  </a:txBody>
+                  <a:tcPr/>
+                </a:tc>
+                <a:tc>
+                  <a:txBody>
+                    <a:bodyPr/>
+                    <a:lstStyle/>
+                    <a:p>
+                      <a:pPr algn="ctr"/>
+                      <a:r>
+                        <a:rPr lang="en-US" altLang="zh-TW" dirty="0"/>
+                        <a:t>0.38</a:t>
+                      </a:r>
+                      <a:endParaRPr dirty="0"/>
+                    </a:p>
+                  </a:txBody>
+                  <a:tcPr/>
+                </a:tc>
+                <a:tc>
+                  <a:txBody>
+                    <a:bodyPr/>
+                    <a:lstStyle/>
+                    <a:p>
+                      <a:pPr algn="ctr"/>
+                      <a:r>
+                        <a:rPr lang="en-US" altLang="zh-TW" dirty="0"/>
+                        <a:t>1.45</a:t>
+                      </a:r>
+                      <a:endParaRPr dirty="0"/>
+                    </a:p>
+                  </a:txBody>
+                  <a:tcPr/>
+                </a:tc>
+                <a:tc>
+                  <a:txBody>
+                    <a:bodyPr/>
+                    <a:lstStyle/>
+                    <a:p>
+                      <a:pPr algn="ctr"/>
+                      <a:r>
+                        <a:rPr lang="en-US" altLang="zh-TW" dirty="0"/>
+                        <a:t>0.35</a:t>
+                      </a:r>
+                      <a:endParaRPr dirty="0"/>
+                    </a:p>
+                  </a:txBody>
+                  <a:tcPr/>
+                </a:tc>
+                <a:extLst>
+                  <a:ext uri="{0D108BD9-81ED-4DB2-BD59-A6C34878D82A}">
+                    <a16:rowId xmlns:a16="http://schemas.microsoft.com/office/drawing/2014/main" val="10001"/>
+                  </a:ext>
+                </a:extLst>
+              </a:tr>
+              <a:tr h="609600">
+                <a:tc>
+                  <a:txBody>
+                    <a:bodyPr/>
+                    <a:lstStyle/>
+                    <a:p>
+                      <a:pPr algn="ctr"/>
+                      <a:r>
+                        <a:rPr sz="1600" dirty="0" err="1"/>
+                        <a:t>理論</a:t>
+                      </a:r>
+                      <a:endParaRPr sz="1600" dirty="0">
+                        <a:latin typeface="標楷體"/>
+                      </a:endParaRPr>
+                    </a:p>
+                  </a:txBody>
+                  <a:tcPr/>
+                </a:tc>
+                <a:tc>
+                  <a:txBody>
+                    <a:bodyPr/>
+                    <a:lstStyle/>
+                    <a:p>
+                      <a:pPr algn="ctr"/>
+                      <a:r>
+                        <a:rPr lang="en-US" altLang="zh-TW" dirty="0"/>
+                        <a:t>6</a:t>
+                      </a:r>
+                      <a:endParaRPr dirty="0"/>
+                    </a:p>
+                  </a:txBody>
+                  <a:tcPr/>
+                </a:tc>
+                <a:tc>
+                  <a:txBody>
+                    <a:bodyPr/>
+                    <a:lstStyle/>
+                    <a:p>
+                      <a:pPr algn="ctr"/>
+                      <a:r>
+                        <a:rPr lang="en-US" altLang="zh-TW" dirty="0"/>
+                        <a:t>2.71</a:t>
+                      </a:r>
+                      <a:endParaRPr dirty="0"/>
+                    </a:p>
+                  </a:txBody>
+                  <a:tcPr/>
+                </a:tc>
+                <a:tc>
+                  <a:txBody>
+                    <a:bodyPr/>
+                    <a:lstStyle/>
+                    <a:p>
+                      <a:pPr algn="ctr"/>
+                      <a:r>
+                        <a:rPr lang="en-US" altLang="zh-TW" dirty="0"/>
+                        <a:t>0.45</a:t>
+                      </a:r>
+                      <a:endParaRPr dirty="0"/>
+                    </a:p>
+                  </a:txBody>
+                  <a:tcPr/>
+                </a:tc>
+                <a:tc>
+                  <a:txBody>
+                    <a:bodyPr/>
+                    <a:lstStyle/>
+                    <a:p>
+                      <a:pPr algn="ctr"/>
+                      <a:r>
+                        <a:rPr lang="en-US" altLang="zh-TW" dirty="0"/>
+                        <a:t>1.71</a:t>
+                      </a:r>
+                      <a:endParaRPr dirty="0"/>
+                    </a:p>
+                  </a:txBody>
+                  <a:tcPr/>
+                </a:tc>
+                <a:tc>
+                  <a:txBody>
+                    <a:bodyPr/>
+                    <a:lstStyle/>
+                    <a:p>
+                      <a:pPr algn="ctr"/>
+                      <a:r>
+                        <a:rPr lang="en-US" altLang="zh-TW" dirty="0"/>
+                        <a:t>0.476</a:t>
+                      </a:r>
+                      <a:endParaRPr dirty="0"/>
+                    </a:p>
+                  </a:txBody>
+                  <a:tcPr/>
+                </a:tc>
+                <a:extLst>
+                  <a:ext uri="{0D108BD9-81ED-4DB2-BD59-A6C34878D82A}">
+                    <a16:rowId xmlns:a16="http://schemas.microsoft.com/office/drawing/2014/main" val="10002"/>
+                  </a:ext>
+                </a:extLst>
+              </a:tr>
+            </a:tbl>
+          </a:graphicData>
+        </a:graphic>
+      </p:graphicFrame>
+    </p:spTree>
+  </p:cSld>
+  <p:clrMapOvr>
+    <a:masterClrMapping/>
+  </p:clrMapOvr>
+</p:sld>
+</file>
+
+<file path=ppt/slides/slide12.xml><?xml version="1.0" encoding="utf-8"?>
+<p:sld xmlns:a="http://schemas.openxmlformats.org/drawingml/2006/main" xmlns:r="http://schemas.openxmlformats.org/officeDocument/2006/relationships" xmlns:p="http://schemas.openxmlformats.org/presentationml/2006/main">
+  <p:cSld>
+    <p:spTree>
+      <p:nvGrpSpPr>
+        <p:cNvPr id="1" name=""/>
+        <p:cNvGrpSpPr/>
+        <p:nvPr/>
+      </p:nvGrpSpPr>
+      <p:grpSpPr>
+        <a:xfrm>
+          <a:off x="0" y="0"/>
+          <a:ext cx="0" cy="0"/>
+          <a:chOff x="0" y="0"/>
+          <a:chExt cx="0" cy="0"/>
+        </a:xfrm>
+      </p:grpSpPr>
+      <p:sp>
+        <p:nvSpPr>
+          <p:cNvPr id="2" name="標題 1"/>
+          <p:cNvSpPr>
+            <a:spLocks noGrp="1"/>
+          </p:cNvSpPr>
+          <p:nvPr>
+            <p:ph type="title"/>
+          </p:nvPr>
+        </p:nvSpPr>
+        <p:spPr/>
+        <p:txBody>
+          <a:bodyPr/>
+          <a:lstStyle/>
+          <a:p>
+            <a:r>
+              <a:rPr lang="zh-TW" altLang="en-US" dirty="0">
+                <a:latin typeface="標楷體" panose="03000509000000000000" pitchFamily="65" charset="-120"/>
+                <a:ea typeface="標楷體" panose="03000509000000000000" pitchFamily="65" charset="-120"/>
+              </a:rPr>
+              <a:t>實驗</a:t>
+            </a:r>
+            <a:r>
+              <a:rPr lang="en-US" altLang="zh-TW" dirty="0">
+                <a:latin typeface="標楷體" panose="03000509000000000000" pitchFamily="65" charset="-120"/>
+                <a:ea typeface="標楷體" panose="03000509000000000000" pitchFamily="65" charset="-120"/>
+              </a:rPr>
+              <a:t>3-2</a:t>
+            </a:r>
+            <a:endParaRPr lang="zh-TW" altLang="en-US" dirty="0">
+              <a:latin typeface="標楷體" panose="03000509000000000000" pitchFamily="65" charset="-120"/>
+              <a:ea typeface="標楷體" panose="03000509000000000000" pitchFamily="65" charset="-120"/>
+            </a:endParaRPr>
+          </a:p>
+        </p:txBody>
+      </p:sp>
+      <p:pic>
+        <p:nvPicPr>
+          <p:cNvPr id="4" name="圖片 3"/>
+          <p:cNvPicPr>
+            <a:picLocks noChangeAspect="1"/>
+          </p:cNvPicPr>
+          <p:nvPr/>
+        </p:nvPicPr>
+        <p:blipFill>
+          <a:blip r:embed="rId2"/>
+          <a:stretch>
+            <a:fillRect/>
+          </a:stretch>
+        </p:blipFill>
+        <p:spPr>
+          <a:xfrm>
+            <a:off x="882277" y="1690688"/>
+            <a:ext cx="10710351" cy="847269"/>
+          </a:xfrm>
+          <a:prstGeom prst="rect">
+            <a:avLst/>
+          </a:prstGeom>
+        </p:spPr>
+      </p:pic>
+      <p:pic>
+        <p:nvPicPr>
+          <p:cNvPr id="5" name="圖片 4"/>
+          <p:cNvPicPr>
+            <a:picLocks noChangeAspect="1"/>
+          </p:cNvPicPr>
+          <p:nvPr/>
+        </p:nvPicPr>
+        <p:blipFill>
+          <a:blip r:embed="rId3" cstate="print">
+            <a:extLst>
+              <a:ext uri="{28A0092B-C50C-407E-A947-70E740481C1C}">
+                <a14:useLocalDpi xmlns:a14="http://schemas.microsoft.com/office/drawing/2010/main" val="0"/>
+              </a:ext>
+            </a:extLst>
+          </a:blip>
+          <a:stretch>
+            <a:fillRect/>
+          </a:stretch>
+        </p:blipFill>
+        <p:spPr>
+          <a:xfrm>
+            <a:off x="644787" y="2799373"/>
+            <a:ext cx="3650667" cy="3362088"/>
+          </a:xfrm>
+          <a:prstGeom prst="rect">
+            <a:avLst/>
+          </a:prstGeom>
+        </p:spPr>
+      </p:pic>
+      <p:pic>
+        <p:nvPicPr>
+          <p:cNvPr id="6" name="圖片 5"/>
+          <p:cNvPicPr>
+            <a:picLocks noChangeAspect="1"/>
+          </p:cNvPicPr>
+          <p:nvPr/>
+        </p:nvPicPr>
+        <p:blipFill>
+          <a:blip r:embed="rId4" cstate="print">
+            <a:extLst>
+              <a:ext uri="{28A0092B-C50C-407E-A947-70E740481C1C}">
+                <a14:useLocalDpi xmlns:a14="http://schemas.microsoft.com/office/drawing/2010/main" val="0"/>
+              </a:ext>
+            </a:extLst>
+          </a:blip>
+          <a:stretch>
+            <a:fillRect/>
+          </a:stretch>
+        </p:blipFill>
+        <p:spPr>
+          <a:xfrm>
+            <a:off x="8328365" y="2799373"/>
+            <a:ext cx="3650667" cy="3362088"/>
+          </a:xfrm>
+          <a:prstGeom prst="rect">
+            <a:avLst/>
+          </a:prstGeom>
+        </p:spPr>
+      </p:pic>
+      <p:pic>
+        <p:nvPicPr>
+          <p:cNvPr id="7" name="圖片 6"/>
+          <p:cNvPicPr>
+            <a:picLocks noChangeAspect="1"/>
+          </p:cNvPicPr>
+          <p:nvPr/>
+        </p:nvPicPr>
+        <p:blipFill>
+          <a:blip r:embed="rId5" cstate="print">
+            <a:extLst>
+              <a:ext uri="{28A0092B-C50C-407E-A947-70E740481C1C}">
+                <a14:useLocalDpi xmlns:a14="http://schemas.microsoft.com/office/drawing/2010/main" val="0"/>
+              </a:ext>
+            </a:extLst>
+          </a:blip>
+          <a:stretch>
+            <a:fillRect/>
+          </a:stretch>
+        </p:blipFill>
+        <p:spPr>
+          <a:xfrm>
+            <a:off x="4486576" y="2799373"/>
+            <a:ext cx="3650667" cy="3362088"/>
+          </a:xfrm>
+          <a:prstGeom prst="rect">
+            <a:avLst/>
+          </a:prstGeom>
+        </p:spPr>
+      </p:pic>
+    </p:spTree>
+    <p:extLst>
+      <p:ext uri="{BB962C8B-B14F-4D97-AF65-F5344CB8AC3E}">
+        <p14:creationId xmlns:p14="http://schemas.microsoft.com/office/powerpoint/2010/main" val="248448261"/>
+      </p:ext>
+    </p:extLst>
+  </p:cSld>
+  <p:clrMapOvr>
+    <a:masterClrMapping/>
+  </p:clrMapOvr>
+</p:sld>
+</file>
+
+<file path=ppt/slides/slide13.xml><?xml version="1.0" encoding="utf-8"?>
+<p:sld xmlns:a="http://schemas.openxmlformats.org/drawingml/2006/main" xmlns:r="http://schemas.openxmlformats.org/officeDocument/2006/relationships" xmlns:p="http://schemas.openxmlformats.org/presentationml/2006/main">
+  <p:cSld>
+    <p:spTree>
+      <p:nvGrpSpPr>
+        <p:cNvPr id="1" name=""/>
+        <p:cNvGrpSpPr/>
+        <p:nvPr/>
+      </p:nvGrpSpPr>
+      <p:grpSpPr>
+        <a:xfrm>
+          <a:off x="0" y="0"/>
+          <a:ext cx="0" cy="0"/>
+          <a:chOff x="0" y="0"/>
+          <a:chExt cx="0" cy="0"/>
+        </a:xfrm>
+      </p:grpSpPr>
+      <p:sp>
+        <p:nvSpPr>
+          <p:cNvPr id="3" name="TextBox 2"/>
+          <p:cNvSpPr txBox="1"/>
+          <p:nvPr/>
+        </p:nvSpPr>
+        <p:spPr>
+          <a:xfrm>
+            <a:off x="4387840" y="182881"/>
+            <a:ext cx="3416320" cy="461665"/>
+          </a:xfrm>
+          <a:prstGeom prst="rect">
+            <a:avLst/>
+          </a:prstGeom>
+          <a:noFill/>
+        </p:spPr>
+        <p:txBody>
+          <a:bodyPr wrap="none">
+            <a:spAutoFit/>
+          </a:bodyPr>
+          <a:lstStyle/>
+          <a:p>
+            <a:pPr algn="ctr">
+              <a:defRPr sz="2400">
+                <a:latin typeface="標楷體"/>
+              </a:defRPr>
+            </a:pPr>
+            <a:r>
+              <a:rPr sz="2400" dirty="0"/>
+              <a:t>表 3-6、P1 </a:t>
+            </a:r>
+            <a:r>
+              <a:rPr sz="2400" dirty="0" err="1"/>
+              <a:t>調整至</a:t>
+            </a:r>
+            <a:r>
+              <a:rPr sz="2400" dirty="0"/>
+              <a:t> 50%</a:t>
+            </a:r>
+          </a:p>
+        </p:txBody>
+      </p:sp>
+      <p:graphicFrame>
+        <p:nvGraphicFramePr>
+          <p:cNvPr id="4" name="Table 3"/>
+          <p:cNvGraphicFramePr>
+            <a:graphicFrameLocks noGrp="1"/>
+          </p:cNvGraphicFramePr>
+          <p:nvPr>
+            <p:extLst>
+              <p:ext uri="{D42A27DB-BD31-4B8C-83A1-F6EECF244321}">
+                <p14:modId xmlns:p14="http://schemas.microsoft.com/office/powerpoint/2010/main" val="1374248378"/>
+              </p:ext>
+            </p:extLst>
+          </p:nvPr>
+        </p:nvGraphicFramePr>
+        <p:xfrm>
+          <a:off x="1981200" y="1097280"/>
+          <a:ext cx="8229600" cy="2042160"/>
+        </p:xfrm>
+        <a:graphic>
+          <a:graphicData uri="http://schemas.openxmlformats.org/drawingml/2006/table">
+            <a:tbl>
+              <a:tblPr firstRow="1" bandRow="1">
+                <a:tableStyleId>{00A15C55-8517-42AA-B614-E9B94910E393}</a:tableStyleId>
+              </a:tblPr>
+              <a:tblGrid>
+                <a:gridCol w="1371600">
+                  <a:extLst>
+                    <a:ext uri="{9D8B030D-6E8A-4147-A177-3AD203B41FA5}">
+                      <a16:colId xmlns:a16="http://schemas.microsoft.com/office/drawing/2014/main" val="20000"/>
+                    </a:ext>
+                  </a:extLst>
+                </a:gridCol>
+                <a:gridCol w="1371600">
+                  <a:extLst>
+                    <a:ext uri="{9D8B030D-6E8A-4147-A177-3AD203B41FA5}">
+                      <a16:colId xmlns:a16="http://schemas.microsoft.com/office/drawing/2014/main" val="20001"/>
+                    </a:ext>
+                  </a:extLst>
+                </a:gridCol>
+                <a:gridCol w="1371600">
+                  <a:extLst>
+                    <a:ext uri="{9D8B030D-6E8A-4147-A177-3AD203B41FA5}">
+                      <a16:colId xmlns:a16="http://schemas.microsoft.com/office/drawing/2014/main" val="20002"/>
+                    </a:ext>
+                  </a:extLst>
+                </a:gridCol>
+                <a:gridCol w="1371600">
+                  <a:extLst>
+                    <a:ext uri="{9D8B030D-6E8A-4147-A177-3AD203B41FA5}">
+                      <a16:colId xmlns:a16="http://schemas.microsoft.com/office/drawing/2014/main" val="20003"/>
+                    </a:ext>
+                  </a:extLst>
+                </a:gridCol>
+                <a:gridCol w="1371600">
+                  <a:extLst>
+                    <a:ext uri="{9D8B030D-6E8A-4147-A177-3AD203B41FA5}">
+                      <a16:colId xmlns:a16="http://schemas.microsoft.com/office/drawing/2014/main" val="20004"/>
+                    </a:ext>
+                  </a:extLst>
+                </a:gridCol>
+                <a:gridCol w="1371600">
+                  <a:extLst>
+                    <a:ext uri="{9D8B030D-6E8A-4147-A177-3AD203B41FA5}">
+                      <a16:colId xmlns:a16="http://schemas.microsoft.com/office/drawing/2014/main" val="20005"/>
+                    </a:ext>
+                  </a:extLst>
+                </a:gridCol>
+              </a:tblGrid>
+              <a:tr h="609600">
+                <a:tc>
+                  <a:txBody>
+                    <a:bodyPr/>
+                    <a:lstStyle/>
+                    <a:p>
+                      <a:pPr algn="ctr"/>
+                      <a:r>
+                        <a:rPr sz="1600" b="1"/>
+                        <a:t>項目</a:t>
+                      </a:r>
+                      <a:endParaRPr sz="1600" b="1">
+                        <a:latin typeface="標楷體"/>
+                      </a:endParaRPr>
+                    </a:p>
+                  </a:txBody>
+                  <a:tcPr/>
+                </a:tc>
+                <a:tc>
+                  <a:txBody>
+                    <a:bodyPr/>
+                    <a:lstStyle/>
+                    <a:p>
+                      <a:pPr algn="ctr"/>
+                      <a:r>
+                        <a:rPr sz="1600" b="1"/>
+                        <a:t>輸入信號
+Ea(V)</a:t>
+                      </a:r>
+                      <a:endParaRPr sz="1600" b="1">
+                        <a:latin typeface="標楷體"/>
+                      </a:endParaRPr>
+                    </a:p>
+                  </a:txBody>
+                  <a:tcPr/>
+                </a:tc>
+                <a:tc>
+                  <a:txBody>
+                    <a:bodyPr/>
+                    <a:lstStyle/>
+                    <a:p>
+                      <a:pPr algn="ctr"/>
+                      <a:r>
+                        <a:rPr sz="1600" b="1"/>
+                        <a:t>響應穩態值
+ωss(V)</a:t>
+                      </a:r>
+                      <a:endParaRPr sz="1600" b="1">
+                        <a:latin typeface="標楷體"/>
+                      </a:endParaRPr>
+                    </a:p>
+                  </a:txBody>
+                  <a:tcPr/>
+                </a:tc>
+                <a:tc>
+                  <a:txBody>
+                    <a:bodyPr/>
+                    <a:lstStyle/>
+                    <a:p>
+                      <a:pPr algn="ctr"/>
+                      <a:r>
+                        <a:rPr sz="1600" b="1" dirty="0" err="1"/>
+                        <a:t>增益</a:t>
+                      </a:r>
+                      <a:r>
+                        <a:rPr sz="1600" b="1" dirty="0"/>
+                        <a:t>
+</a:t>
+                      </a:r>
+                      <a:r>
+                        <a:rPr sz="1600" b="1" dirty="0" err="1"/>
+                        <a:t>ωss</a:t>
+                      </a:r>
+                      <a:r>
+                        <a:rPr sz="1600" b="1" dirty="0"/>
+                        <a:t>(V)/</a:t>
+                      </a:r>
+                      <a:r>
+                        <a:rPr sz="1600" b="1" dirty="0" err="1"/>
+                        <a:t>Ea</a:t>
+                      </a:r>
+                      <a:r>
+                        <a:rPr sz="1600" b="1" dirty="0"/>
+                        <a:t>(V)</a:t>
+                      </a:r>
+                      <a:endParaRPr sz="1600" b="1" dirty="0">
+                        <a:latin typeface="標楷體"/>
+                      </a:endParaRPr>
+                    </a:p>
+                  </a:txBody>
+                  <a:tcPr/>
+                </a:tc>
+                <a:tc>
+                  <a:txBody>
+                    <a:bodyPr/>
+                    <a:lstStyle/>
+                    <a:p>
+                      <a:pPr algn="ctr"/>
+                      <a:r>
+                        <a:rPr sz="1600" b="1"/>
+                        <a:t>步階響應值
+0.632*ωss(V)</a:t>
+                      </a:r>
+                      <a:endParaRPr sz="1600" b="1">
+                        <a:latin typeface="標楷體"/>
+                      </a:endParaRPr>
+                    </a:p>
+                  </a:txBody>
+                  <a:tcPr/>
+                </a:tc>
+                <a:tc>
+                  <a:txBody>
+                    <a:bodyPr/>
+                    <a:lstStyle/>
+                    <a:p>
+                      <a:pPr algn="ctr"/>
+                      <a:r>
+                        <a:rPr sz="1600" b="1"/>
+                        <a:t>時間常數
+τv</a:t>
+                      </a:r>
+                      <a:endParaRPr sz="1600" b="1">
+                        <a:latin typeface="標楷體"/>
+                      </a:endParaRPr>
+                    </a:p>
+                  </a:txBody>
+                  <a:tcPr/>
+                </a:tc>
+                <a:extLst>
+                  <a:ext uri="{0D108BD9-81ED-4DB2-BD59-A6C34878D82A}">
+                    <a16:rowId xmlns:a16="http://schemas.microsoft.com/office/drawing/2014/main" val="10000"/>
+                  </a:ext>
+                </a:extLst>
+              </a:tr>
+              <a:tr h="609600">
+                <a:tc>
+                  <a:txBody>
+                    <a:bodyPr/>
+                    <a:lstStyle/>
+                    <a:p>
+                      <a:pPr algn="ctr"/>
+                      <a:r>
+                        <a:rPr sz="1600"/>
+                        <a:t>實驗</a:t>
+                      </a:r>
+                      <a:endParaRPr sz="1600">
+                        <a:latin typeface="標楷體"/>
+                      </a:endParaRPr>
+                    </a:p>
+                  </a:txBody>
+                  <a:tcPr/>
+                </a:tc>
+                <a:tc>
+                  <a:txBody>
+                    <a:bodyPr/>
+                    <a:lstStyle/>
+                    <a:p>
+                      <a:pPr algn="ctr"/>
+                      <a:r>
+                        <a:rPr lang="en-US" altLang="zh-TW" dirty="0"/>
+                        <a:t>5.97</a:t>
+                      </a:r>
+                      <a:endParaRPr dirty="0"/>
+                    </a:p>
+                  </a:txBody>
+                  <a:tcPr/>
+                </a:tc>
+                <a:tc>
+                  <a:txBody>
+                    <a:bodyPr/>
+                    <a:lstStyle/>
+                    <a:p>
+                      <a:pPr algn="ctr"/>
+                      <a:r>
+                        <a:rPr lang="en-US" altLang="zh-TW" dirty="0"/>
+                        <a:t>3.6</a:t>
+                      </a:r>
+                      <a:endParaRPr dirty="0"/>
+                    </a:p>
+                  </a:txBody>
+                  <a:tcPr/>
+                </a:tc>
+                <a:tc>
+                  <a:txBody>
+                    <a:bodyPr/>
+                    <a:lstStyle/>
+                    <a:p>
+                      <a:pPr algn="ctr"/>
+                      <a:r>
+                        <a:rPr lang="en-US" altLang="zh-TW" dirty="0"/>
+                        <a:t>0.6</a:t>
+                      </a:r>
+                      <a:endParaRPr dirty="0"/>
+                    </a:p>
+                  </a:txBody>
+                  <a:tcPr/>
+                </a:tc>
+                <a:tc>
+                  <a:txBody>
+                    <a:bodyPr/>
+                    <a:lstStyle/>
+                    <a:p>
+                      <a:pPr algn="ctr"/>
+                      <a:r>
+                        <a:rPr lang="en-US" altLang="zh-TW" dirty="0"/>
+                        <a:t>2.27</a:t>
+                      </a:r>
+                      <a:endParaRPr dirty="0"/>
+                    </a:p>
+                  </a:txBody>
+                  <a:tcPr/>
+                </a:tc>
+                <a:tc>
+                  <a:txBody>
+                    <a:bodyPr/>
+                    <a:lstStyle/>
+                    <a:p>
+                      <a:pPr algn="ctr"/>
+                      <a:r>
+                        <a:rPr lang="en-US" altLang="zh-TW" dirty="0"/>
+                        <a:t>0.31</a:t>
+                      </a:r>
+                      <a:endParaRPr dirty="0"/>
+                    </a:p>
+                  </a:txBody>
+                  <a:tcPr/>
+                </a:tc>
+                <a:extLst>
+                  <a:ext uri="{0D108BD9-81ED-4DB2-BD59-A6C34878D82A}">
+                    <a16:rowId xmlns:a16="http://schemas.microsoft.com/office/drawing/2014/main" val="10001"/>
+                  </a:ext>
+                </a:extLst>
+              </a:tr>
+              <a:tr h="609600">
+                <a:tc>
+                  <a:txBody>
+                    <a:bodyPr/>
+                    <a:lstStyle/>
+                    <a:p>
+                      <a:pPr algn="ctr"/>
+                      <a:r>
+                        <a:rPr sz="1600"/>
+                        <a:t>理論</a:t>
+                      </a:r>
+                      <a:endParaRPr sz="1600">
+                        <a:latin typeface="標楷體"/>
+                      </a:endParaRPr>
+                    </a:p>
+                  </a:txBody>
+                  <a:tcPr/>
+                </a:tc>
+                <a:tc>
+                  <a:txBody>
+                    <a:bodyPr/>
+                    <a:lstStyle/>
+                    <a:p>
+                      <a:pPr algn="ctr"/>
+                      <a:r>
+                        <a:rPr lang="en-US" altLang="zh-TW" dirty="0"/>
+                        <a:t>6</a:t>
+                      </a:r>
+                      <a:endParaRPr dirty="0"/>
+                    </a:p>
+                  </a:txBody>
+                  <a:tcPr/>
+                </a:tc>
+                <a:tc>
+                  <a:txBody>
+                    <a:bodyPr/>
+                    <a:lstStyle/>
+                    <a:p>
+                      <a:pPr algn="ctr"/>
+                      <a:r>
+                        <a:rPr lang="en-US" altLang="zh-TW" dirty="0"/>
+                        <a:t>3.73</a:t>
+                      </a:r>
+                      <a:endParaRPr dirty="0"/>
+                    </a:p>
+                  </a:txBody>
+                  <a:tcPr/>
+                </a:tc>
+                <a:tc>
+                  <a:txBody>
+                    <a:bodyPr/>
+                    <a:lstStyle/>
+                    <a:p>
+                      <a:pPr algn="ctr"/>
+                      <a:r>
+                        <a:rPr lang="en-US" altLang="zh-TW" dirty="0"/>
+                        <a:t>0.62</a:t>
+                      </a:r>
+                      <a:endParaRPr dirty="0"/>
+                    </a:p>
+                  </a:txBody>
+                  <a:tcPr/>
+                </a:tc>
+                <a:tc>
+                  <a:txBody>
+                    <a:bodyPr/>
+                    <a:lstStyle/>
+                    <a:p>
+                      <a:pPr algn="ctr"/>
+                      <a:r>
+                        <a:rPr lang="en-US" altLang="zh-TW" dirty="0"/>
+                        <a:t>2.36</a:t>
+                      </a:r>
+                      <a:endParaRPr dirty="0"/>
+                    </a:p>
+                  </a:txBody>
+                  <a:tcPr/>
+                </a:tc>
+                <a:tc>
+                  <a:txBody>
+                    <a:bodyPr/>
+                    <a:lstStyle/>
+                    <a:p>
+                      <a:pPr algn="ctr"/>
+                      <a:r>
+                        <a:rPr lang="en-US" altLang="zh-TW" dirty="0"/>
+                        <a:t>0.328</a:t>
+                      </a:r>
+                      <a:endParaRPr dirty="0"/>
+                    </a:p>
+                  </a:txBody>
+                  <a:tcPr/>
+                </a:tc>
+                <a:extLst>
+                  <a:ext uri="{0D108BD9-81ED-4DB2-BD59-A6C34878D82A}">
+                    <a16:rowId xmlns:a16="http://schemas.microsoft.com/office/drawing/2014/main" val="10002"/>
+                  </a:ext>
+                </a:extLst>
+              </a:tr>
+            </a:tbl>
+          </a:graphicData>
+        </a:graphic>
+      </p:graphicFrame>
+    </p:spTree>
+  </p:cSld>
+  <p:clrMapOvr>
+    <a:masterClrMapping/>
+  </p:clrMapOvr>
+</p:sld>
+</file>
+
+<file path=ppt/slides/slide14.xml><?xml version="1.0" encoding="utf-8"?>
+<p:sld xmlns:a="http://schemas.openxmlformats.org/drawingml/2006/main" xmlns:r="http://schemas.openxmlformats.org/officeDocument/2006/relationships" xmlns:p="http://schemas.openxmlformats.org/presentationml/2006/main">
+  <p:cSld>
+    <p:spTree>
+      <p:nvGrpSpPr>
+        <p:cNvPr id="1" name=""/>
+        <p:cNvGrpSpPr/>
+        <p:nvPr/>
+      </p:nvGrpSpPr>
+      <p:grpSpPr>
+        <a:xfrm>
+          <a:off x="0" y="0"/>
+          <a:ext cx="0" cy="0"/>
+          <a:chOff x="0" y="0"/>
+          <a:chExt cx="0" cy="0"/>
+        </a:xfrm>
+      </p:grpSpPr>
+      <p:sp>
+        <p:nvSpPr>
+          <p:cNvPr id="2" name="標題 1"/>
+          <p:cNvSpPr>
+            <a:spLocks noGrp="1"/>
+          </p:cNvSpPr>
+          <p:nvPr>
+            <p:ph type="title"/>
+          </p:nvPr>
+        </p:nvSpPr>
+        <p:spPr/>
+        <p:txBody>
+          <a:bodyPr/>
+          <a:lstStyle/>
+          <a:p>
+            <a:r>
+              <a:rPr lang="zh-TW" altLang="en-US" dirty="0">
+                <a:latin typeface="標楷體" panose="03000509000000000000" pitchFamily="65" charset="-120"/>
+                <a:ea typeface="標楷體" panose="03000509000000000000" pitchFamily="65" charset="-120"/>
+              </a:rPr>
+              <a:t>實驗</a:t>
+            </a:r>
+            <a:r>
+              <a:rPr lang="en-US" altLang="zh-TW" dirty="0">
+                <a:latin typeface="標楷體" panose="03000509000000000000" pitchFamily="65" charset="-120"/>
+                <a:ea typeface="標楷體" panose="03000509000000000000" pitchFamily="65" charset="-120"/>
+              </a:rPr>
+              <a:t>3-2</a:t>
             </a:r>
             <a:endParaRPr lang="zh-TW" altLang="en-US" dirty="0">
               <a:latin typeface="標楷體" panose="03000509000000000000" pitchFamily="65" charset="-120"/>
@@ -4224,7 +5568,450 @@
 </p:sld>
 </file>
 
-<file path=ppt/slides/slide11.xml><?xml version="1.0" encoding="utf-8"?>
+<file path=ppt/slides/slide15.xml><?xml version="1.0" encoding="utf-8"?>
+<p:sld xmlns:a="http://schemas.openxmlformats.org/drawingml/2006/main" xmlns:r="http://schemas.openxmlformats.org/officeDocument/2006/relationships" xmlns:p="http://schemas.openxmlformats.org/presentationml/2006/main">
+  <p:cSld>
+    <p:spTree>
+      <p:nvGrpSpPr>
+        <p:cNvPr id="1" name=""/>
+        <p:cNvGrpSpPr/>
+        <p:nvPr/>
+      </p:nvGrpSpPr>
+      <p:grpSpPr>
+        <a:xfrm>
+          <a:off x="0" y="0"/>
+          <a:ext cx="0" cy="0"/>
+          <a:chOff x="0" y="0"/>
+          <a:chExt cx="0" cy="0"/>
+        </a:xfrm>
+      </p:grpSpPr>
+      <p:sp>
+        <p:nvSpPr>
+          <p:cNvPr id="3" name="TextBox 2"/>
+          <p:cNvSpPr txBox="1"/>
+          <p:nvPr/>
+        </p:nvSpPr>
+        <p:spPr>
+          <a:xfrm>
+            <a:off x="4387840" y="182881"/>
+            <a:ext cx="3416320" cy="461665"/>
+          </a:xfrm>
+          <a:prstGeom prst="rect">
+            <a:avLst/>
+          </a:prstGeom>
+          <a:noFill/>
+        </p:spPr>
+        <p:txBody>
+          <a:bodyPr wrap="none">
+            <a:spAutoFit/>
+          </a:bodyPr>
+          <a:lstStyle/>
+          <a:p>
+            <a:pPr algn="ctr">
+              <a:defRPr sz="2400">
+                <a:latin typeface="標楷體"/>
+              </a:defRPr>
+            </a:pPr>
+            <a:r>
+              <a:rPr sz="2400"/>
+              <a:t>表 3-7、P1 調整至 80%</a:t>
+            </a:r>
+          </a:p>
+        </p:txBody>
+      </p:sp>
+      <p:graphicFrame>
+        <p:nvGraphicFramePr>
+          <p:cNvPr id="4" name="Table 3"/>
+          <p:cNvGraphicFramePr>
+            <a:graphicFrameLocks noGrp="1"/>
+          </p:cNvGraphicFramePr>
+          <p:nvPr>
+            <p:extLst>
+              <p:ext uri="{D42A27DB-BD31-4B8C-83A1-F6EECF244321}">
+                <p14:modId xmlns:p14="http://schemas.microsoft.com/office/powerpoint/2010/main" val="1405709974"/>
+              </p:ext>
+            </p:extLst>
+          </p:nvPr>
+        </p:nvGraphicFramePr>
+        <p:xfrm>
+          <a:off x="1981200" y="1097280"/>
+          <a:ext cx="8229600" cy="2042160"/>
+        </p:xfrm>
+        <a:graphic>
+          <a:graphicData uri="http://schemas.openxmlformats.org/drawingml/2006/table">
+            <a:tbl>
+              <a:tblPr firstRow="1" bandRow="1">
+                <a:tableStyleId>{00A15C55-8517-42AA-B614-E9B94910E393}</a:tableStyleId>
+              </a:tblPr>
+              <a:tblGrid>
+                <a:gridCol w="1371600">
+                  <a:extLst>
+                    <a:ext uri="{9D8B030D-6E8A-4147-A177-3AD203B41FA5}">
+                      <a16:colId xmlns:a16="http://schemas.microsoft.com/office/drawing/2014/main" val="20000"/>
+                    </a:ext>
+                  </a:extLst>
+                </a:gridCol>
+                <a:gridCol w="1371600">
+                  <a:extLst>
+                    <a:ext uri="{9D8B030D-6E8A-4147-A177-3AD203B41FA5}">
+                      <a16:colId xmlns:a16="http://schemas.microsoft.com/office/drawing/2014/main" val="20001"/>
+                    </a:ext>
+                  </a:extLst>
+                </a:gridCol>
+                <a:gridCol w="1371600">
+                  <a:extLst>
+                    <a:ext uri="{9D8B030D-6E8A-4147-A177-3AD203B41FA5}">
+                      <a16:colId xmlns:a16="http://schemas.microsoft.com/office/drawing/2014/main" val="20002"/>
+                    </a:ext>
+                  </a:extLst>
+                </a:gridCol>
+                <a:gridCol w="1371600">
+                  <a:extLst>
+                    <a:ext uri="{9D8B030D-6E8A-4147-A177-3AD203B41FA5}">
+                      <a16:colId xmlns:a16="http://schemas.microsoft.com/office/drawing/2014/main" val="20003"/>
+                    </a:ext>
+                  </a:extLst>
+                </a:gridCol>
+                <a:gridCol w="1371600">
+                  <a:extLst>
+                    <a:ext uri="{9D8B030D-6E8A-4147-A177-3AD203B41FA5}">
+                      <a16:colId xmlns:a16="http://schemas.microsoft.com/office/drawing/2014/main" val="20004"/>
+                    </a:ext>
+                  </a:extLst>
+                </a:gridCol>
+                <a:gridCol w="1371600">
+                  <a:extLst>
+                    <a:ext uri="{9D8B030D-6E8A-4147-A177-3AD203B41FA5}">
+                      <a16:colId xmlns:a16="http://schemas.microsoft.com/office/drawing/2014/main" val="20005"/>
+                    </a:ext>
+                  </a:extLst>
+                </a:gridCol>
+              </a:tblGrid>
+              <a:tr h="609600">
+                <a:tc>
+                  <a:txBody>
+                    <a:bodyPr/>
+                    <a:lstStyle/>
+                    <a:p>
+                      <a:pPr algn="ctr"/>
+                      <a:r>
+                        <a:rPr sz="1600" b="1" dirty="0" err="1"/>
+                        <a:t>項目</a:t>
+                      </a:r>
+                      <a:endParaRPr sz="1600" b="1" dirty="0">
+                        <a:latin typeface="標楷體"/>
+                      </a:endParaRPr>
+                    </a:p>
+                  </a:txBody>
+                  <a:tcPr/>
+                </a:tc>
+                <a:tc>
+                  <a:txBody>
+                    <a:bodyPr/>
+                    <a:lstStyle/>
+                    <a:p>
+                      <a:pPr algn="ctr"/>
+                      <a:r>
+                        <a:rPr sz="1600" b="1"/>
+                        <a:t>輸入信號
+Ea(V)</a:t>
+                      </a:r>
+                      <a:endParaRPr sz="1600" b="1">
+                        <a:latin typeface="標楷體"/>
+                      </a:endParaRPr>
+                    </a:p>
+                  </a:txBody>
+                  <a:tcPr/>
+                </a:tc>
+                <a:tc>
+                  <a:txBody>
+                    <a:bodyPr/>
+                    <a:lstStyle/>
+                    <a:p>
+                      <a:pPr algn="ctr"/>
+                      <a:r>
+                        <a:rPr sz="1600" b="1"/>
+                        <a:t>響應穩態值
+ωss(V)</a:t>
+                      </a:r>
+                      <a:endParaRPr sz="1600" b="1">
+                        <a:latin typeface="標楷體"/>
+                      </a:endParaRPr>
+                    </a:p>
+                  </a:txBody>
+                  <a:tcPr/>
+                </a:tc>
+                <a:tc>
+                  <a:txBody>
+                    <a:bodyPr/>
+                    <a:lstStyle/>
+                    <a:p>
+                      <a:pPr algn="ctr"/>
+                      <a:r>
+                        <a:rPr sz="1600" b="1"/>
+                        <a:t>增益
+ωss(V)/Ea(V)</a:t>
+                      </a:r>
+                      <a:endParaRPr sz="1600" b="1">
+                        <a:latin typeface="標楷體"/>
+                      </a:endParaRPr>
+                    </a:p>
+                  </a:txBody>
+                  <a:tcPr/>
+                </a:tc>
+                <a:tc>
+                  <a:txBody>
+                    <a:bodyPr/>
+                    <a:lstStyle/>
+                    <a:p>
+                      <a:pPr algn="ctr"/>
+                      <a:r>
+                        <a:rPr sz="1600" b="1"/>
+                        <a:t>步階響應值
+0.632*ωss(V)</a:t>
+                      </a:r>
+                      <a:endParaRPr sz="1600" b="1">
+                        <a:latin typeface="標楷體"/>
+                      </a:endParaRPr>
+                    </a:p>
+                  </a:txBody>
+                  <a:tcPr/>
+                </a:tc>
+                <a:tc>
+                  <a:txBody>
+                    <a:bodyPr/>
+                    <a:lstStyle/>
+                    <a:p>
+                      <a:pPr algn="ctr"/>
+                      <a:r>
+                        <a:rPr sz="1600" b="1"/>
+                        <a:t>時間常數
+τv</a:t>
+                      </a:r>
+                      <a:endParaRPr sz="1600" b="1">
+                        <a:latin typeface="標楷體"/>
+                      </a:endParaRPr>
+                    </a:p>
+                  </a:txBody>
+                  <a:tcPr/>
+                </a:tc>
+                <a:extLst>
+                  <a:ext uri="{0D108BD9-81ED-4DB2-BD59-A6C34878D82A}">
+                    <a16:rowId xmlns:a16="http://schemas.microsoft.com/office/drawing/2014/main" val="10000"/>
+                  </a:ext>
+                </a:extLst>
+              </a:tr>
+              <a:tr h="609600">
+                <a:tc>
+                  <a:txBody>
+                    <a:bodyPr/>
+                    <a:lstStyle/>
+                    <a:p>
+                      <a:pPr algn="ctr"/>
+                      <a:r>
+                        <a:rPr sz="1600"/>
+                        <a:t>實驗</a:t>
+                      </a:r>
+                      <a:endParaRPr sz="1600">
+                        <a:latin typeface="標楷體"/>
+                      </a:endParaRPr>
+                    </a:p>
+                  </a:txBody>
+                  <a:tcPr/>
+                </a:tc>
+                <a:tc>
+                  <a:txBody>
+                    <a:bodyPr/>
+                    <a:lstStyle/>
+                    <a:p>
+                      <a:pPr algn="ctr"/>
+                      <a:r>
+                        <a:rPr lang="en-US" altLang="zh-TW" dirty="0"/>
+                        <a:t>6.1</a:t>
+                      </a:r>
+                      <a:endParaRPr dirty="0"/>
+                    </a:p>
+                  </a:txBody>
+                  <a:tcPr/>
+                </a:tc>
+                <a:tc>
+                  <a:txBody>
+                    <a:bodyPr/>
+                    <a:lstStyle/>
+                    <a:p>
+                      <a:pPr algn="ctr"/>
+                      <a:r>
+                        <a:rPr lang="en-US" altLang="zh-TW" dirty="0"/>
+                        <a:t>4.29</a:t>
+                      </a:r>
+                      <a:endParaRPr dirty="0"/>
+                    </a:p>
+                  </a:txBody>
+                  <a:tcPr/>
+                </a:tc>
+                <a:tc>
+                  <a:txBody>
+                    <a:bodyPr/>
+                    <a:lstStyle/>
+                    <a:p>
+                      <a:pPr algn="ctr"/>
+                      <a:r>
+                        <a:rPr lang="en-US" altLang="zh-TW" dirty="0"/>
+                        <a:t>0.7</a:t>
+                      </a:r>
+                      <a:endParaRPr dirty="0"/>
+                    </a:p>
+                  </a:txBody>
+                  <a:tcPr/>
+                </a:tc>
+                <a:tc>
+                  <a:txBody>
+                    <a:bodyPr/>
+                    <a:lstStyle/>
+                    <a:p>
+                      <a:pPr algn="ctr"/>
+                      <a:r>
+                        <a:rPr lang="en-US" altLang="zh-TW" dirty="0"/>
+                        <a:t>2.71</a:t>
+                      </a:r>
+                      <a:endParaRPr dirty="0"/>
+                    </a:p>
+                  </a:txBody>
+                  <a:tcPr/>
+                </a:tc>
+                <a:tc>
+                  <a:txBody>
+                    <a:bodyPr/>
+                    <a:lstStyle/>
+                    <a:p>
+                      <a:pPr algn="ctr"/>
+                      <a:r>
+                        <a:rPr lang="en-US" altLang="zh-TW" dirty="0"/>
+                        <a:t>0.2</a:t>
+                      </a:r>
+                      <a:endParaRPr dirty="0"/>
+                    </a:p>
+                  </a:txBody>
+                  <a:tcPr/>
+                </a:tc>
+                <a:extLst>
+                  <a:ext uri="{0D108BD9-81ED-4DB2-BD59-A6C34878D82A}">
+                    <a16:rowId xmlns:a16="http://schemas.microsoft.com/office/drawing/2014/main" val="10001"/>
+                  </a:ext>
+                </a:extLst>
+              </a:tr>
+              <a:tr h="609600">
+                <a:tc>
+                  <a:txBody>
+                    <a:bodyPr/>
+                    <a:lstStyle/>
+                    <a:p>
+                      <a:pPr algn="ctr"/>
+                      <a:r>
+                        <a:rPr sz="1600"/>
+                        <a:t>理論</a:t>
+                      </a:r>
+                      <a:endParaRPr sz="1600">
+                        <a:latin typeface="標楷體"/>
+                      </a:endParaRPr>
+                    </a:p>
+                  </a:txBody>
+                  <a:tcPr/>
+                </a:tc>
+                <a:tc>
+                  <a:txBody>
+                    <a:bodyPr/>
+                    <a:lstStyle/>
+                    <a:p>
+                      <a:pPr algn="ctr"/>
+                      <a:r>
+                        <a:rPr lang="en-US" altLang="zh-TW" dirty="0"/>
+                        <a:t>6</a:t>
+                      </a:r>
+                      <a:endParaRPr dirty="0"/>
+                    </a:p>
+                  </a:txBody>
+                  <a:tcPr/>
+                </a:tc>
+                <a:tc>
+                  <a:txBody>
+                    <a:bodyPr/>
+                    <a:lstStyle/>
+                    <a:p>
+                      <a:pPr algn="ctr"/>
+                      <a:r>
+                        <a:rPr lang="en-US" altLang="zh-TW" dirty="0"/>
+                        <a:t>4.35</a:t>
+                      </a:r>
+                      <a:endParaRPr dirty="0"/>
+                    </a:p>
+                  </a:txBody>
+                  <a:tcPr/>
+                </a:tc>
+                <a:tc>
+                  <a:txBody>
+                    <a:bodyPr/>
+                    <a:lstStyle/>
+                    <a:p>
+                      <a:pPr algn="ctr"/>
+                      <a:r>
+                        <a:rPr lang="en-US" altLang="zh-TW" dirty="0"/>
+                        <a:t>0.72</a:t>
+                      </a:r>
+                      <a:endParaRPr dirty="0"/>
+                    </a:p>
+                  </a:txBody>
+                  <a:tcPr/>
+                </a:tc>
+                <a:tc>
+                  <a:txBody>
+                    <a:bodyPr/>
+                    <a:lstStyle/>
+                    <a:p>
+                      <a:pPr algn="ctr"/>
+                      <a:r>
+                        <a:rPr lang="en-US" altLang="zh-TW" dirty="0"/>
+                        <a:t>2.75</a:t>
+                      </a:r>
+                      <a:endParaRPr dirty="0"/>
+                    </a:p>
+                  </a:txBody>
+                  <a:tcPr/>
+                </a:tc>
+                <a:tc>
+                  <a:txBody>
+                    <a:bodyPr/>
+                    <a:lstStyle/>
+                    <a:p>
+                      <a:pPr algn="ctr"/>
+                      <a:r>
+                        <a:rPr lang="en-US" altLang="zh-TW" dirty="0"/>
+                        <a:t>0.239</a:t>
+                      </a:r>
+                      <a:endParaRPr dirty="0"/>
+                    </a:p>
+                  </a:txBody>
+                  <a:tcPr/>
+                </a:tc>
+                <a:extLst>
+                  <a:ext uri="{0D108BD9-81ED-4DB2-BD59-A6C34878D82A}">
+                    <a16:rowId xmlns:a16="http://schemas.microsoft.com/office/drawing/2014/main" val="10002"/>
+                  </a:ext>
+                </a:extLst>
+              </a:tr>
+            </a:tbl>
+          </a:graphicData>
+        </a:graphic>
+      </p:graphicFrame>
+    </p:spTree>
+  </p:cSld>
+  <p:clrMapOvr>
+    <a:masterClrMapping/>
+  </p:clrMapOvr>
+</p:sld>
+</file>
+
+<file path=ppt/slides/slide16.xml><?xml version="1.0" encoding="utf-8"?>
 <p:sld xmlns:a="http://schemas.openxmlformats.org/drawingml/2006/main" xmlns:r="http://schemas.openxmlformats.org/officeDocument/2006/relationships" xmlns:p="http://schemas.openxmlformats.org/presentationml/2006/main">
   <p:cSld>
     <p:spTree>
@@ -4293,14 +6080,59 @@
         </p:blipFill>
         <p:spPr>
           <a:xfrm>
-            <a:off x="838200" y="1520847"/>
-            <a:ext cx="9539364" cy="339681"/>
+            <a:off x="838200" y="1690688"/>
+            <a:ext cx="10096893" cy="359534"/>
           </a:xfrm>
           <a:prstGeom prst="rect">
             <a:avLst/>
           </a:prstGeom>
         </p:spPr>
       </p:pic>
+      <p:sp>
+        <p:nvSpPr>
+          <p:cNvPr id="3" name="文字方塊 2">
+            <a:extLst>
+              <a:ext uri="{FF2B5EF4-FFF2-40B4-BE49-F238E27FC236}">
+                <a16:creationId xmlns:a16="http://schemas.microsoft.com/office/drawing/2014/main" id="{DB24F576-96EE-5CE5-BABC-1E31F0329957}"/>
+              </a:ext>
+            </a:extLst>
+          </p:cNvPr>
+          <p:cNvSpPr txBox="1"/>
+          <p:nvPr/>
+        </p:nvSpPr>
+        <p:spPr>
+          <a:xfrm>
+            <a:off x="1470188" y="2785418"/>
+            <a:ext cx="8832915" cy="461665"/>
+          </a:xfrm>
+          <a:prstGeom prst="rect">
+            <a:avLst/>
+          </a:prstGeom>
+          <a:noFill/>
+        </p:spPr>
+        <p:txBody>
+          <a:bodyPr wrap="square" rtlCol="0">
+            <a:spAutoFit/>
+          </a:bodyPr>
+          <a:lstStyle/>
+          <a:p>
+            <a:r>
+              <a:rPr lang="en-US" altLang="zh-TW" sz="2400" dirty="0">
+                <a:latin typeface="標楷體" panose="03000509000000000000" pitchFamily="65" charset="-120"/>
+                <a:ea typeface="標楷體" panose="03000509000000000000" pitchFamily="65" charset="-120"/>
+              </a:rPr>
+              <a:t>Ans:</a:t>
+            </a:r>
+            <a:r>
+              <a:rPr lang="zh-TW" altLang="en-US" sz="2400" dirty="0">
+                <a:latin typeface="標楷體" panose="03000509000000000000" pitchFamily="65" charset="-120"/>
+                <a:ea typeface="標楷體" panose="03000509000000000000" pitchFamily="65" charset="-120"/>
+              </a:rPr>
+              <a:t>時間常數的數值會下降，導致上升時間變快，更快進入穩態</a:t>
+            </a:r>
+          </a:p>
+        </p:txBody>
+      </p:sp>
     </p:spTree>
     <p:extLst>
       <p:ext uri="{BB962C8B-B14F-4D97-AF65-F5344CB8AC3E}">
@@ -4314,7 +6146,7 @@
 </p:sld>
 </file>
 
-<file path=ppt/slides/slide12.xml><?xml version="1.0" encoding="utf-8"?>
+<file path=ppt/slides/slide17.xml><?xml version="1.0" encoding="utf-8"?>
 <p:sld xmlns:a="http://schemas.openxmlformats.org/drawingml/2006/main" xmlns:r="http://schemas.openxmlformats.org/officeDocument/2006/relationships" xmlns:p="http://schemas.openxmlformats.org/presentationml/2006/main">
   <p:cSld>
     <p:spTree>
@@ -4347,7 +6179,10 @@
           <a:lstStyle/>
           <a:p>
             <a:r>
-              <a:rPr lang="zh-TW" altLang="en-US" dirty="0"/>
+              <a:rPr lang="zh-TW" altLang="en-US" dirty="0">
+                <a:latin typeface="標楷體" panose="03000509000000000000" pitchFamily="65" charset="-120"/>
+                <a:ea typeface="標楷體" panose="03000509000000000000" pitchFamily="65" charset="-120"/>
+              </a:rPr>
               <a:t>問題討論</a:t>
             </a:r>
           </a:p>
@@ -4368,14 +6203,59 @@
         </p:blipFill>
         <p:spPr>
           <a:xfrm>
-            <a:off x="838200" y="1606467"/>
-            <a:ext cx="11031974" cy="348665"/>
+            <a:off x="1096652" y="1690688"/>
+            <a:ext cx="10257148" cy="324176"/>
           </a:xfrm>
           <a:prstGeom prst="rect">
             <a:avLst/>
           </a:prstGeom>
         </p:spPr>
       </p:pic>
+      <p:sp>
+        <p:nvSpPr>
+          <p:cNvPr id="4" name="文字方塊 3">
+            <a:extLst>
+              <a:ext uri="{FF2B5EF4-FFF2-40B4-BE49-F238E27FC236}">
+                <a16:creationId xmlns:a16="http://schemas.microsoft.com/office/drawing/2014/main" id="{285F8466-BC7B-AC4E-AE43-9B40636EB613}"/>
+              </a:ext>
+            </a:extLst>
+          </p:cNvPr>
+          <p:cNvSpPr txBox="1"/>
+          <p:nvPr/>
+        </p:nvSpPr>
+        <p:spPr>
+          <a:xfrm>
+            <a:off x="1406165" y="2785418"/>
+            <a:ext cx="9379670" cy="461665"/>
+          </a:xfrm>
+          <a:prstGeom prst="rect">
+            <a:avLst/>
+          </a:prstGeom>
+          <a:noFill/>
+        </p:spPr>
+        <p:txBody>
+          <a:bodyPr wrap="square" rtlCol="0">
+            <a:spAutoFit/>
+          </a:bodyPr>
+          <a:lstStyle/>
+          <a:p>
+            <a:r>
+              <a:rPr lang="en-US" altLang="zh-TW" sz="2400" dirty="0">
+                <a:latin typeface="標楷體" panose="03000509000000000000" pitchFamily="65" charset="-120"/>
+                <a:ea typeface="標楷體" panose="03000509000000000000" pitchFamily="65" charset="-120"/>
+              </a:rPr>
+              <a:t>Ans:</a:t>
+            </a:r>
+            <a:r>
+              <a:rPr lang="zh-TW" altLang="en-US" sz="2400" dirty="0">
+                <a:latin typeface="標楷體" panose="03000509000000000000" pitchFamily="65" charset="-120"/>
+                <a:ea typeface="標楷體" panose="03000509000000000000" pitchFamily="65" charset="-120"/>
+              </a:rPr>
+              <a:t>增加比例增益，會使輸出電壓更接近輸入電壓，降低系統誤差值</a:t>
+            </a:r>
+          </a:p>
+        </p:txBody>
+      </p:sp>
     </p:spTree>
     <p:extLst>
       <p:ext uri="{BB962C8B-B14F-4D97-AF65-F5344CB8AC3E}">
@@ -4389,7 +6269,7 @@
 </p:sld>
 </file>
 
-<file path=ppt/slides/slide13.xml><?xml version="1.0" encoding="utf-8"?>
+<file path=ppt/slides/slide18.xml><?xml version="1.0" encoding="utf-8"?>
 <p:sld xmlns:a="http://schemas.openxmlformats.org/drawingml/2006/main" xmlns:r="http://schemas.openxmlformats.org/officeDocument/2006/relationships" xmlns:p="http://schemas.openxmlformats.org/presentationml/2006/main">
   <p:cSld>
     <p:spTree>
@@ -4454,26 +6334,49 @@
       </p:pic>
       <p:pic>
         <p:nvPicPr>
-          <p:cNvPr id="5" name="圖片 4"/>
+          <p:cNvPr id="2050" name="Picture 2">
+            <a:extLst>
+              <a:ext uri="{FF2B5EF4-FFF2-40B4-BE49-F238E27FC236}">
+                <a16:creationId xmlns:a16="http://schemas.microsoft.com/office/drawing/2014/main" id="{102D6700-2041-72B3-267B-5987896CD9B1}"/>
+              </a:ext>
+            </a:extLst>
+          </p:cNvPr>
           <p:cNvPicPr>
-            <a:picLocks noChangeAspect="1"/>
+            <a:picLocks noChangeAspect="1" noChangeArrowheads="1"/>
           </p:cNvPicPr>
           <p:nvPr/>
         </p:nvPicPr>
         <p:blipFill>
-          <a:blip r:embed="rId3"/>
+          <a:blip r:embed="rId3" cstate="print">
+            <a:extLst>
+              <a:ext uri="{28A0092B-C50C-407E-A947-70E740481C1C}">
+                <a14:useLocalDpi xmlns:a14="http://schemas.microsoft.com/office/drawing/2010/main" val="0"/>
+              </a:ext>
+            </a:extLst>
+          </a:blip>
+          <a:srcRect/>
           <a:stretch>
             <a:fillRect/>
           </a:stretch>
         </p:blipFill>
-        <p:spPr>
+        <p:spPr bwMode="auto">
           <a:xfrm>
-            <a:off x="2429473" y="2659043"/>
-            <a:ext cx="5685827" cy="3790552"/>
+            <a:off x="2519982" y="2584175"/>
+            <a:ext cx="6413389" cy="4151932"/>
           </a:xfrm>
           <a:prstGeom prst="rect">
             <a:avLst/>
           </a:prstGeom>
+          <a:noFill/>
+          <a:extLst>
+            <a:ext uri="{909E8E84-426E-40DD-AFC4-6F175D3DCCD1}">
+              <a14:hiddenFill xmlns:a14="http://schemas.microsoft.com/office/drawing/2010/main">
+                <a:solidFill>
+                  <a:srgbClr val="FFFFFF"/>
+                </a:solidFill>
+              </a14:hiddenFill>
+            </a:ext>
+          </a:extLst>
         </p:spPr>
       </p:pic>
     </p:spTree>
@@ -4489,12 +6392,18 @@
 </p:sld>
 </file>
 
-<file path=ppt/slides/slide14.xml><?xml version="1.0" encoding="utf-8"?>
+<file path=ppt/slides/slide19.xml><?xml version="1.0" encoding="utf-8"?>
 <p:sld xmlns:a="http://schemas.openxmlformats.org/drawingml/2006/main" xmlns:r="http://schemas.openxmlformats.org/officeDocument/2006/relationships" xmlns:p="http://schemas.openxmlformats.org/presentationml/2006/main">
   <p:cSld>
     <p:spTree>
       <p:nvGrpSpPr>
-        <p:cNvPr id="1" name=""/>
+        <p:cNvPr id="1" name="">
+          <a:extLst>
+            <a:ext uri="{FF2B5EF4-FFF2-40B4-BE49-F238E27FC236}">
+              <a16:creationId xmlns:a16="http://schemas.microsoft.com/office/drawing/2014/main" id="{AE587C64-B8C5-3F6D-0F1C-1CEC563826EA}"/>
+            </a:ext>
+          </a:extLst>
+        </p:cNvPr>
         <p:cNvGrpSpPr/>
         <p:nvPr/>
       </p:nvGrpSpPr>
@@ -4508,7 +6417,13 @@
       </p:grpSpPr>
       <p:sp>
         <p:nvSpPr>
-          <p:cNvPr id="2" name="標題 1"/>
+          <p:cNvPr id="2" name="標題 1">
+            <a:extLst>
+              <a:ext uri="{FF2B5EF4-FFF2-40B4-BE49-F238E27FC236}">
+                <a16:creationId xmlns:a16="http://schemas.microsoft.com/office/drawing/2014/main" id="{7B8BD6D1-CD00-2A25-A09B-6C53C90FE5B8}"/>
+              </a:ext>
+            </a:extLst>
+          </p:cNvPr>
           <p:cNvSpPr>
             <a:spLocks noGrp="1"/>
           </p:cNvSpPr>
@@ -4530,7 +6445,13 @@
       </p:sp>
       <p:pic>
         <p:nvPicPr>
-          <p:cNvPr id="4" name="圖片 3"/>
+          <p:cNvPr id="4" name="圖片 3">
+            <a:extLst>
+              <a:ext uri="{FF2B5EF4-FFF2-40B4-BE49-F238E27FC236}">
+                <a16:creationId xmlns:a16="http://schemas.microsoft.com/office/drawing/2014/main" id="{F1D5CECB-5D92-07D7-5A26-71D0555B2077}"/>
+              </a:ext>
+            </a:extLst>
+          </p:cNvPr>
           <p:cNvPicPr>
             <a:picLocks noChangeAspect="1"/>
           </p:cNvPicPr>
@@ -4544,18 +6465,155 @@
         </p:blipFill>
         <p:spPr>
           <a:xfrm>
-            <a:off x="838200" y="1509687"/>
-            <a:ext cx="6687483" cy="362001"/>
+            <a:off x="484632" y="2143639"/>
+            <a:ext cx="10401569" cy="726536"/>
           </a:xfrm>
           <a:prstGeom prst="rect">
             <a:avLst/>
           </a:prstGeom>
         </p:spPr>
       </p:pic>
+      <p:pic>
+        <p:nvPicPr>
+          <p:cNvPr id="3074" name="Picture 2" descr="一張含有 螢幕擷取畫面, 文字, Rectangle, 行 的圖片&#10;&#10;AI 產生的內容可能不正確。">
+            <a:extLst>
+              <a:ext uri="{FF2B5EF4-FFF2-40B4-BE49-F238E27FC236}">
+                <a16:creationId xmlns:a16="http://schemas.microsoft.com/office/drawing/2014/main" id="{9D377122-21FF-D08C-BCA0-530AE90113FB}"/>
+              </a:ext>
+            </a:extLst>
+          </p:cNvPr>
+          <p:cNvPicPr>
+            <a:picLocks noChangeArrowheads="1"/>
+          </p:cNvPicPr>
+          <p:nvPr/>
+        </p:nvPicPr>
+        <p:blipFill>
+          <a:blip r:embed="rId3" cstate="print">
+            <a:extLst>
+              <a:ext uri="{28A0092B-C50C-407E-A947-70E740481C1C}">
+                <a14:useLocalDpi xmlns:a14="http://schemas.microsoft.com/office/drawing/2010/main" val="0"/>
+              </a:ext>
+            </a:extLst>
+          </a:blip>
+          <a:srcRect t="6741" b="15688"/>
+          <a:stretch/>
+        </p:blipFill>
+        <p:spPr bwMode="auto">
+          <a:xfrm>
+            <a:off x="385237" y="3507653"/>
+            <a:ext cx="3600000" cy="2520000"/>
+          </a:xfrm>
+          <a:prstGeom prst="rect">
+            <a:avLst/>
+          </a:prstGeom>
+          <a:noFill/>
+          <a:extLst>
+            <a:ext uri="{909E8E84-426E-40DD-AFC4-6F175D3DCCD1}">
+              <a14:hiddenFill xmlns:a14="http://schemas.microsoft.com/office/drawing/2010/main">
+                <a:solidFill>
+                  <a:srgbClr val="FFFFFF"/>
+                </a:solidFill>
+              </a14:hiddenFill>
+            </a:ext>
+          </a:extLst>
+        </p:spPr>
+      </p:pic>
+      <p:pic>
+        <p:nvPicPr>
+          <p:cNvPr id="3078" name="Picture 6" descr="一張含有 文字, 螢幕擷取畫面, 行, 繪圖 的圖片&#10;&#10;AI 產生的內容可能不正確。">
+            <a:extLst>
+              <a:ext uri="{FF2B5EF4-FFF2-40B4-BE49-F238E27FC236}">
+                <a16:creationId xmlns:a16="http://schemas.microsoft.com/office/drawing/2014/main" id="{F4C338A9-4FD8-15BB-7193-32F08C6CD7A5}"/>
+              </a:ext>
+            </a:extLst>
+          </p:cNvPr>
+          <p:cNvPicPr>
+            <a:picLocks noChangeArrowheads="1"/>
+          </p:cNvPicPr>
+          <p:nvPr/>
+        </p:nvPicPr>
+        <p:blipFill>
+          <a:blip r:embed="rId4" cstate="print">
+            <a:extLst>
+              <a:ext uri="{28A0092B-C50C-407E-A947-70E740481C1C}">
+                <a14:useLocalDpi xmlns:a14="http://schemas.microsoft.com/office/drawing/2010/main" val="0"/>
+              </a:ext>
+            </a:extLst>
+          </a:blip>
+          <a:stretch>
+            <a:fillRect/>
+          </a:stretch>
+        </p:blipFill>
+        <p:spPr bwMode="auto">
+          <a:xfrm>
+            <a:off x="4126464" y="3507653"/>
+            <a:ext cx="3600000" cy="2520000"/>
+          </a:xfrm>
+          <a:prstGeom prst="rect">
+            <a:avLst/>
+          </a:prstGeom>
+          <a:noFill/>
+          <a:extLst>
+            <a:ext uri="{909E8E84-426E-40DD-AFC4-6F175D3DCCD1}">
+              <a14:hiddenFill xmlns:a14="http://schemas.microsoft.com/office/drawing/2010/main">
+                <a:solidFill>
+                  <a:srgbClr val="FFFFFF"/>
+                </a:solidFill>
+              </a14:hiddenFill>
+            </a:ext>
+          </a:extLst>
+        </p:spPr>
+      </p:pic>
+      <p:pic>
+        <p:nvPicPr>
+          <p:cNvPr id="3076" name="Picture 4" descr="一張含有 行, 繪圖, 文字, 螢幕擷取畫面 的圖片&#10;&#10;AI 產生的內容可能不正確。">
+            <a:extLst>
+              <a:ext uri="{FF2B5EF4-FFF2-40B4-BE49-F238E27FC236}">
+                <a16:creationId xmlns:a16="http://schemas.microsoft.com/office/drawing/2014/main" id="{3B2729F9-AB72-FA8B-32CF-B8084CF07449}"/>
+              </a:ext>
+            </a:extLst>
+          </p:cNvPr>
+          <p:cNvPicPr>
+            <a:picLocks noChangeArrowheads="1"/>
+          </p:cNvPicPr>
+          <p:nvPr/>
+        </p:nvPicPr>
+        <p:blipFill>
+          <a:blip r:embed="rId5" cstate="print">
+            <a:extLst>
+              <a:ext uri="{28A0092B-C50C-407E-A947-70E740481C1C}">
+                <a14:useLocalDpi xmlns:a14="http://schemas.microsoft.com/office/drawing/2010/main" val="0"/>
+              </a:ext>
+            </a:extLst>
+          </a:blip>
+          <a:stretch>
+            <a:fillRect/>
+          </a:stretch>
+        </p:blipFill>
+        <p:spPr bwMode="auto">
+          <a:xfrm>
+            <a:off x="7927675" y="3507653"/>
+            <a:ext cx="3600000" cy="2520000"/>
+          </a:xfrm>
+          <a:prstGeom prst="rect">
+            <a:avLst/>
+          </a:prstGeom>
+          <a:noFill/>
+          <a:extLst>
+            <a:ext uri="{909E8E84-426E-40DD-AFC4-6F175D3DCCD1}">
+              <a14:hiddenFill xmlns:a14="http://schemas.microsoft.com/office/drawing/2010/main">
+                <a:solidFill>
+                  <a:srgbClr val="FFFFFF"/>
+                </a:solidFill>
+              </a14:hiddenFill>
+            </a:ext>
+          </a:extLst>
+        </p:spPr>
+      </p:pic>
     </p:spTree>
     <p:extLst>
       <p:ext uri="{BB962C8B-B14F-4D97-AF65-F5344CB8AC3E}">
-        <p14:creationId xmlns:p14="http://schemas.microsoft.com/office/powerpoint/2010/main" val="986050787"/>
+        <p14:creationId xmlns:p14="http://schemas.microsoft.com/office/powerpoint/2010/main" val="206819322"/>
       </p:ext>
     </p:extLst>
   </p:cSld>
@@ -4598,18 +6656,18 @@
           <a:lstStyle/>
           <a:p>
             <a:r>
-              <a:rPr lang="zh-TW" altLang="en-US" dirty="0" smtClean="0">
+              <a:rPr lang="zh-TW" altLang="en-US" dirty="0">
                 <a:latin typeface="標楷體" panose="03000509000000000000" pitchFamily="65" charset="-120"/>
                 <a:ea typeface="標楷體" panose="03000509000000000000" pitchFamily="65" charset="-120"/>
               </a:rPr>
               <a:t>實驗</a:t>
             </a:r>
             <a:r>
-              <a:rPr lang="en-US" altLang="zh-TW" dirty="0" smtClean="0">
+              <a:rPr lang="en-US" altLang="zh-TW" dirty="0">
                 <a:latin typeface="標楷體" panose="03000509000000000000" pitchFamily="65" charset="-120"/>
                 <a:ea typeface="標楷體" panose="03000509000000000000" pitchFamily="65" charset="-120"/>
               </a:rPr>
-              <a:t>2-1</a:t>
+              <a:t>3-1</a:t>
             </a:r>
             <a:endParaRPr lang="zh-TW" altLang="en-US" dirty="0">
               <a:latin typeface="標楷體" panose="03000509000000000000" pitchFamily="65" charset="-120"/>
@@ -4655,7 +6713,7 @@
 </p:sld>
 </file>
 
-<file path=ppt/slides/slide3.xml><?xml version="1.0" encoding="utf-8"?>
+<file path=ppt/slides/slide20.xml><?xml version="1.0" encoding="utf-8"?>
 <p:sld xmlns:a="http://schemas.openxmlformats.org/drawingml/2006/main" xmlns:r="http://schemas.openxmlformats.org/officeDocument/2006/relationships" xmlns:p="http://schemas.openxmlformats.org/presentationml/2006/main">
   <p:cSld>
     <p:spTree>
@@ -4688,18 +6746,1335 @@
           <a:lstStyle/>
           <a:p>
             <a:r>
-              <a:rPr lang="zh-TW" altLang="en-US" dirty="0" smtClean="0">
+              <a:rPr lang="zh-TW" altLang="en-US" dirty="0"/>
+              <a:t>問題討論</a:t>
+            </a:r>
+          </a:p>
+        </p:txBody>
+      </p:sp>
+      <p:pic>
+        <p:nvPicPr>
+          <p:cNvPr id="4" name="圖片 3"/>
+          <p:cNvPicPr>
+            <a:picLocks noChangeAspect="1"/>
+          </p:cNvPicPr>
+          <p:nvPr/>
+        </p:nvPicPr>
+        <p:blipFill>
+          <a:blip r:embed="rId2"/>
+          <a:stretch>
+            <a:fillRect/>
+          </a:stretch>
+        </p:blipFill>
+        <p:spPr>
+          <a:xfrm>
+            <a:off x="508797" y="1690688"/>
+            <a:ext cx="10401569" cy="726536"/>
+          </a:xfrm>
+          <a:prstGeom prst="rect">
+            <a:avLst/>
+          </a:prstGeom>
+        </p:spPr>
+      </p:pic>
+      <p:pic>
+        <p:nvPicPr>
+          <p:cNvPr id="3" name="圖片 2"/>
+          <p:cNvPicPr>
+            <a:picLocks noChangeAspect="1"/>
+          </p:cNvPicPr>
+          <p:nvPr/>
+        </p:nvPicPr>
+        <p:blipFill>
+          <a:blip r:embed="rId3"/>
+          <a:stretch>
+            <a:fillRect/>
+          </a:stretch>
+        </p:blipFill>
+        <p:spPr>
+          <a:xfrm>
+            <a:off x="4188426" y="2236808"/>
+            <a:ext cx="4003847" cy="4036173"/>
+          </a:xfrm>
+          <a:prstGeom prst="rect">
+            <a:avLst/>
+          </a:prstGeom>
+        </p:spPr>
+      </p:pic>
+    </p:spTree>
+    <p:extLst>
+      <p:ext uri="{BB962C8B-B14F-4D97-AF65-F5344CB8AC3E}">
+        <p14:creationId xmlns:p14="http://schemas.microsoft.com/office/powerpoint/2010/main" val="3252445571"/>
+      </p:ext>
+    </p:extLst>
+  </p:cSld>
+  <p:clrMapOvr>
+    <a:masterClrMapping/>
+  </p:clrMapOvr>
+</p:sld>
+</file>
+
+<file path=ppt/slides/slide21.xml><?xml version="1.0" encoding="utf-8"?>
+<p:sld xmlns:a="http://schemas.openxmlformats.org/drawingml/2006/main" xmlns:r="http://schemas.openxmlformats.org/officeDocument/2006/relationships" xmlns:p="http://schemas.openxmlformats.org/presentationml/2006/main">
+  <p:cSld>
+    <p:spTree>
+      <p:nvGrpSpPr>
+        <p:cNvPr id="1" name=""/>
+        <p:cNvGrpSpPr/>
+        <p:nvPr/>
+      </p:nvGrpSpPr>
+      <p:grpSpPr>
+        <a:xfrm>
+          <a:off x="0" y="0"/>
+          <a:ext cx="0" cy="0"/>
+          <a:chOff x="0" y="0"/>
+          <a:chExt cx="0" cy="0"/>
+        </a:xfrm>
+      </p:grpSpPr>
+      <p:sp>
+        <p:nvSpPr>
+          <p:cNvPr id="2" name="標題 1"/>
+          <p:cNvSpPr>
+            <a:spLocks noGrp="1"/>
+          </p:cNvSpPr>
+          <p:nvPr>
+            <p:ph type="title"/>
+          </p:nvPr>
+        </p:nvSpPr>
+        <p:spPr>
+          <a:xfrm>
+            <a:off x="838200" y="188035"/>
+            <a:ext cx="10515600" cy="1325563"/>
+          </a:xfrm>
+        </p:spPr>
+        <p:txBody>
+          <a:bodyPr/>
+          <a:lstStyle/>
+          <a:p>
+            <a:r>
+              <a:rPr lang="zh-TW" altLang="en-US" dirty="0">
+                <a:latin typeface="標楷體" panose="03000509000000000000" pitchFamily="65" charset="-120"/>
+                <a:ea typeface="標楷體" panose="03000509000000000000" pitchFamily="65" charset="-120"/>
+              </a:rPr>
+              <a:t>問題討論</a:t>
+            </a:r>
+          </a:p>
+        </p:txBody>
+      </p:sp>
+      <p:pic>
+        <p:nvPicPr>
+          <p:cNvPr id="4" name="圖片 3"/>
+          <p:cNvPicPr>
+            <a:picLocks noChangeAspect="1"/>
+          </p:cNvPicPr>
+          <p:nvPr/>
+        </p:nvPicPr>
+        <p:blipFill>
+          <a:blip r:embed="rId2"/>
+          <a:stretch>
+            <a:fillRect/>
+          </a:stretch>
+        </p:blipFill>
+        <p:spPr>
+          <a:xfrm>
+            <a:off x="1593130" y="1513598"/>
+            <a:ext cx="6542988" cy="354179"/>
+          </a:xfrm>
+          <a:prstGeom prst="rect">
+            <a:avLst/>
+          </a:prstGeom>
+        </p:spPr>
+      </p:pic>
+      <p:sp>
+        <p:nvSpPr>
+          <p:cNvPr id="3" name="文字方塊 2">
+            <a:extLst>
+              <a:ext uri="{FF2B5EF4-FFF2-40B4-BE49-F238E27FC236}">
+                <a16:creationId xmlns:a16="http://schemas.microsoft.com/office/drawing/2014/main" id="{82A4281A-DA0D-8703-9E06-ECCED605A520}"/>
+              </a:ext>
+            </a:extLst>
+          </p:cNvPr>
+          <p:cNvSpPr txBox="1"/>
+          <p:nvPr/>
+        </p:nvSpPr>
+        <p:spPr>
+          <a:xfrm>
+            <a:off x="1593130" y="2235085"/>
+            <a:ext cx="7371760" cy="1200329"/>
+          </a:xfrm>
+          <a:prstGeom prst="rect">
+            <a:avLst/>
+          </a:prstGeom>
+          <a:noFill/>
+        </p:spPr>
+        <p:txBody>
+          <a:bodyPr wrap="square" rtlCol="0">
+            <a:spAutoFit/>
+          </a:bodyPr>
+          <a:lstStyle/>
+          <a:p>
+            <a:r>
+              <a:rPr lang="zh-TW" altLang="en-US" sz="2400" dirty="0">
+                <a:latin typeface="標楷體" panose="03000509000000000000" pitchFamily="65" charset="-120"/>
+                <a:ea typeface="標楷體" panose="03000509000000000000" pitchFamily="65" charset="-120"/>
+              </a:rPr>
+              <a:t>閉迴路系統加入了反饋電路，使得其對外部干擾訊號的靈敏度下降，因此所測得的結果會比較精確，得到的增益也會上升</a:t>
+            </a:r>
+          </a:p>
+        </p:txBody>
+      </p:sp>
+    </p:spTree>
+    <p:extLst>
+      <p:ext uri="{BB962C8B-B14F-4D97-AF65-F5344CB8AC3E}">
+        <p14:creationId xmlns:p14="http://schemas.microsoft.com/office/powerpoint/2010/main" val="986050787"/>
+      </p:ext>
+    </p:extLst>
+  </p:cSld>
+  <p:clrMapOvr>
+    <a:masterClrMapping/>
+  </p:clrMapOvr>
+</p:sld>
+</file>
+
+<file path=ppt/slides/slide3.xml><?xml version="1.0" encoding="utf-8"?>
+<p:sld xmlns:a="http://schemas.openxmlformats.org/drawingml/2006/main" xmlns:r="http://schemas.openxmlformats.org/officeDocument/2006/relationships" xmlns:p="http://schemas.openxmlformats.org/presentationml/2006/main">
+  <p:cSld>
+    <p:spTree>
+      <p:nvGrpSpPr>
+        <p:cNvPr id="1" name=""/>
+        <p:cNvGrpSpPr/>
+        <p:nvPr/>
+      </p:nvGrpSpPr>
+      <p:grpSpPr>
+        <a:xfrm>
+          <a:off x="0" y="0"/>
+          <a:ext cx="0" cy="0"/>
+          <a:chOff x="0" y="0"/>
+          <a:chExt cx="0" cy="0"/>
+        </a:xfrm>
+      </p:grpSpPr>
+      <p:sp>
+        <p:nvSpPr>
+          <p:cNvPr id="16" name="文字方塊 15">
+            <a:extLst>
+              <a:ext uri="{FF2B5EF4-FFF2-40B4-BE49-F238E27FC236}">
+                <a16:creationId xmlns:a16="http://schemas.microsoft.com/office/drawing/2014/main" id="{8E766198-534D-4528-46D6-AD65EF3729E7}"/>
+              </a:ext>
+            </a:extLst>
+          </p:cNvPr>
+          <p:cNvSpPr txBox="1"/>
+          <p:nvPr/>
+        </p:nvSpPr>
+        <p:spPr>
+          <a:xfrm>
+            <a:off x="3997601" y="399714"/>
+            <a:ext cx="4196798" cy="461665"/>
+          </a:xfrm>
+          <a:prstGeom prst="rect">
+            <a:avLst/>
+          </a:prstGeom>
+          <a:noFill/>
+        </p:spPr>
+        <p:txBody>
+          <a:bodyPr wrap="square">
+            <a:spAutoFit/>
+          </a:bodyPr>
+          <a:lstStyle/>
+          <a:p>
+            <a:pPr algn="ctr">
+              <a:defRPr sz="2400">
+                <a:latin typeface="標楷體"/>
+              </a:defRPr>
+            </a:pPr>
+            <a:r>
+              <a:rPr lang="zh-TW" altLang="en-US" sz="2400" dirty="0"/>
+              <a:t>表 </a:t>
+            </a:r>
+            <a:r>
+              <a:rPr lang="en-US" altLang="zh-TW" sz="2400" dirty="0"/>
+              <a:t>3-1</a:t>
+            </a:r>
+            <a:r>
+              <a:rPr lang="zh-TW" altLang="en-US" sz="2400" dirty="0"/>
+              <a:t>、</a:t>
+            </a:r>
+            <a:r>
+              <a:rPr lang="en-US" altLang="zh-TW" sz="2400" dirty="0"/>
+              <a:t>+5V </a:t>
+            </a:r>
+            <a:r>
+              <a:rPr lang="zh-TW" altLang="en-US" sz="2400" dirty="0"/>
+              <a:t>直流馬達增益</a:t>
+            </a:r>
+          </a:p>
+        </p:txBody>
+      </p:sp>
+      <p:graphicFrame>
+        <p:nvGraphicFramePr>
+          <p:cNvPr id="17" name="Table 3"/>
+          <p:cNvGraphicFramePr>
+            <a:graphicFrameLocks noGrp="1"/>
+          </p:cNvGraphicFramePr>
+          <p:nvPr>
+            <p:extLst>
+              <p:ext uri="{D42A27DB-BD31-4B8C-83A1-F6EECF244321}">
+                <p14:modId xmlns:p14="http://schemas.microsoft.com/office/powerpoint/2010/main" val="2937450149"/>
+              </p:ext>
+            </p:extLst>
+          </p:nvPr>
+        </p:nvGraphicFramePr>
+        <p:xfrm>
+          <a:off x="3173272" y="1428226"/>
+          <a:ext cx="5845456" cy="1286292"/>
+        </p:xfrm>
+        <a:graphic>
+          <a:graphicData uri="http://schemas.openxmlformats.org/drawingml/2006/table">
+            <a:tbl>
+              <a:tblPr firstRow="1" bandRow="1">
+                <a:tableStyleId>{00A15C55-8517-42AA-B614-E9B94910E393}</a:tableStyleId>
+              </a:tblPr>
+              <a:tblGrid>
+                <a:gridCol w="1461364">
+                  <a:extLst>
+                    <a:ext uri="{9D8B030D-6E8A-4147-A177-3AD203B41FA5}">
+                      <a16:colId xmlns:a16="http://schemas.microsoft.com/office/drawing/2014/main" val="20000"/>
+                    </a:ext>
+                  </a:extLst>
+                </a:gridCol>
+                <a:gridCol w="1461364">
+                  <a:extLst>
+                    <a:ext uri="{9D8B030D-6E8A-4147-A177-3AD203B41FA5}">
+                      <a16:colId xmlns:a16="http://schemas.microsoft.com/office/drawing/2014/main" val="20001"/>
+                    </a:ext>
+                  </a:extLst>
+                </a:gridCol>
+                <a:gridCol w="1461364">
+                  <a:extLst>
+                    <a:ext uri="{9D8B030D-6E8A-4147-A177-3AD203B41FA5}">
+                      <a16:colId xmlns:a16="http://schemas.microsoft.com/office/drawing/2014/main" val="20002"/>
+                    </a:ext>
+                  </a:extLst>
+                </a:gridCol>
+                <a:gridCol w="1461364">
+                  <a:extLst>
+                    <a:ext uri="{9D8B030D-6E8A-4147-A177-3AD203B41FA5}">
+                      <a16:colId xmlns:a16="http://schemas.microsoft.com/office/drawing/2014/main" val="20003"/>
+                    </a:ext>
+                  </a:extLst>
+                </a:gridCol>
+              </a:tblGrid>
+              <a:tr h="675693">
+                <a:tc>
+                  <a:txBody>
+                    <a:bodyPr/>
+                    <a:lstStyle/>
+                    <a:p>
+                      <a:pPr algn="ctr"/>
+                      <a:r>
+                        <a:rPr sz="1600" b="1" dirty="0" err="1"/>
+                        <a:t>步階輸入訊號</a:t>
+                      </a:r>
+                      <a:r>
+                        <a:rPr sz="1600" b="1" dirty="0"/>
+                        <a:t>
+</a:t>
+                      </a:r>
+                      <a:r>
+                        <a:rPr sz="1600" b="1" dirty="0" err="1"/>
+                        <a:t>E</a:t>
+                      </a:r>
+                      <a:r>
+                        <a:rPr sz="1200" b="1" dirty="0" err="1"/>
+                        <a:t>a</a:t>
+                      </a:r>
+                      <a:r>
+                        <a:rPr sz="1600" b="1" dirty="0"/>
+                        <a:t>(V)</a:t>
+                      </a:r>
+                      <a:endParaRPr sz="1600" b="1" dirty="0">
+                        <a:latin typeface="標楷體"/>
+                      </a:endParaRPr>
+                    </a:p>
+                  </a:txBody>
+                  <a:tcPr/>
+                </a:tc>
+                <a:tc>
+                  <a:txBody>
+                    <a:bodyPr/>
+                    <a:lstStyle/>
+                    <a:p>
+                      <a:pPr algn="ctr"/>
+                      <a:r>
+                        <a:rPr sz="1600" b="1" dirty="0" err="1"/>
+                        <a:t>響應穩態值</a:t>
+                      </a:r>
+                      <a:r>
+                        <a:rPr sz="1600" b="1" dirty="0"/>
+                        <a:t>
+</a:t>
+                      </a:r>
+                      <a:r>
+                        <a:rPr sz="1600" b="1" dirty="0" err="1"/>
+                        <a:t>ω</a:t>
+                      </a:r>
+                      <a:r>
+                        <a:rPr sz="1200" b="1" dirty="0" err="1"/>
+                        <a:t>ss</a:t>
+                      </a:r>
+                      <a:r>
+                        <a:rPr sz="1600" b="1" dirty="0"/>
+                        <a:t>(rpm)</a:t>
+                      </a:r>
+                      <a:endParaRPr sz="1600" b="1" dirty="0">
+                        <a:latin typeface="標楷體"/>
+                      </a:endParaRPr>
+                    </a:p>
+                  </a:txBody>
+                  <a:tcPr/>
+                </a:tc>
+                <a:tc>
+                  <a:txBody>
+                    <a:bodyPr/>
+                    <a:lstStyle/>
+                    <a:p>
+                      <a:pPr algn="ctr"/>
+                      <a:r>
+                        <a:rPr sz="1600" b="1" dirty="0" err="1"/>
+                        <a:t>響應穩態值</a:t>
+                      </a:r>
+                      <a:r>
+                        <a:rPr sz="1600" b="1" dirty="0"/>
+                        <a:t>
+</a:t>
+                      </a:r>
+                      <a:r>
+                        <a:rPr sz="1600" b="1" dirty="0" err="1"/>
+                        <a:t>ω</a:t>
+                      </a:r>
+                      <a:r>
+                        <a:rPr sz="1200" b="1" dirty="0" err="1"/>
+                        <a:t>ss</a:t>
+                      </a:r>
+                      <a:r>
+                        <a:rPr sz="1600" b="1" dirty="0"/>
+                        <a:t>(V)</a:t>
+                      </a:r>
+                      <a:endParaRPr sz="1600" b="1" dirty="0">
+                        <a:latin typeface="標楷體"/>
+                      </a:endParaRPr>
+                    </a:p>
+                  </a:txBody>
+                  <a:tcPr/>
+                </a:tc>
+                <a:tc>
+                  <a:txBody>
+                    <a:bodyPr/>
+                    <a:lstStyle/>
+                    <a:p>
+                      <a:pPr algn="ctr"/>
+                      <a:r>
+                        <a:rPr sz="1600" b="1" dirty="0" err="1"/>
+                        <a:t>直流馬達增益</a:t>
+                      </a:r>
+                      <a:r>
+                        <a:rPr sz="1600" b="1" dirty="0"/>
+                        <a:t>
+k</a:t>
+                      </a:r>
+                      <a:r>
+                        <a:rPr sz="1200" b="1" dirty="0"/>
+                        <a:t>m</a:t>
+                      </a:r>
+                      <a:r>
+                        <a:rPr sz="1600" b="1" dirty="0"/>
+                        <a:t>=</a:t>
+                      </a:r>
+                      <a:r>
+                        <a:rPr sz="1600" b="1" dirty="0" err="1"/>
+                        <a:t>ω</a:t>
+                      </a:r>
+                      <a:r>
+                        <a:rPr sz="1200" b="1" dirty="0" err="1"/>
+                        <a:t>ss</a:t>
+                      </a:r>
+                      <a:r>
+                        <a:rPr sz="1600" b="1" dirty="0"/>
+                        <a:t>(rpm)/</a:t>
+                      </a:r>
+                      <a:r>
+                        <a:rPr sz="1600" b="1" dirty="0" err="1"/>
+                        <a:t>E</a:t>
+                      </a:r>
+                      <a:r>
+                        <a:rPr sz="1200" b="1" dirty="0" err="1"/>
+                        <a:t>a</a:t>
+                      </a:r>
+                      <a:r>
+                        <a:rPr sz="1600" b="1" dirty="0"/>
+                        <a:t>(V)</a:t>
+                      </a:r>
+                      <a:endParaRPr sz="1600" b="1" dirty="0">
+                        <a:latin typeface="標楷體"/>
+                      </a:endParaRPr>
+                    </a:p>
+                  </a:txBody>
+                  <a:tcPr/>
+                </a:tc>
+                <a:extLst>
+                  <a:ext uri="{0D108BD9-81ED-4DB2-BD59-A6C34878D82A}">
+                    <a16:rowId xmlns:a16="http://schemas.microsoft.com/office/drawing/2014/main" val="10000"/>
+                  </a:ext>
+                </a:extLst>
+              </a:tr>
+              <a:tr h="463332">
+                <a:tc>
+                  <a:txBody>
+                    <a:bodyPr/>
+                    <a:lstStyle/>
+                    <a:p>
+                      <a:pPr algn="ctr"/>
+                      <a:r>
+                        <a:rPr lang="en-US" altLang="zh-TW" dirty="0"/>
+                        <a:t>5</a:t>
+                      </a:r>
+                      <a:endParaRPr dirty="0"/>
+                    </a:p>
+                  </a:txBody>
+                  <a:tcPr/>
+                </a:tc>
+                <a:tc>
+                  <a:txBody>
+                    <a:bodyPr/>
+                    <a:lstStyle/>
+                    <a:p>
+                      <a:pPr algn="ctr"/>
+                      <a:r>
+                        <a:rPr lang="en-US" altLang="zh-TW" dirty="0"/>
+                        <a:t>1536</a:t>
+                      </a:r>
+                      <a:endParaRPr dirty="0"/>
+                    </a:p>
+                  </a:txBody>
+                  <a:tcPr/>
+                </a:tc>
+                <a:tc>
+                  <a:txBody>
+                    <a:bodyPr/>
+                    <a:lstStyle/>
+                    <a:p>
+                      <a:pPr algn="ctr"/>
+                      <a:r>
+                        <a:rPr lang="en-US" altLang="zh-TW" dirty="0"/>
+                        <a:t>4.34</a:t>
+                      </a:r>
+                      <a:endParaRPr dirty="0"/>
+                    </a:p>
+                  </a:txBody>
+                  <a:tcPr/>
+                </a:tc>
+                <a:tc>
+                  <a:txBody>
+                    <a:bodyPr/>
+                    <a:lstStyle/>
+                    <a:p>
+                      <a:pPr algn="ctr"/>
+                      <a:r>
+                        <a:rPr lang="en-US" altLang="zh-TW" dirty="0"/>
+                        <a:t>307.2</a:t>
+                      </a:r>
+                      <a:endParaRPr dirty="0"/>
+                    </a:p>
+                  </a:txBody>
+                  <a:tcPr/>
+                </a:tc>
+                <a:extLst>
+                  <a:ext uri="{0D108BD9-81ED-4DB2-BD59-A6C34878D82A}">
+                    <a16:rowId xmlns:a16="http://schemas.microsoft.com/office/drawing/2014/main" val="10001"/>
+                  </a:ext>
+                </a:extLst>
+              </a:tr>
+            </a:tbl>
+          </a:graphicData>
+        </a:graphic>
+      </p:graphicFrame>
+      <p:sp>
+        <p:nvSpPr>
+          <p:cNvPr id="19" name="文字方塊 18">
+            <a:extLst>
+              <a:ext uri="{FF2B5EF4-FFF2-40B4-BE49-F238E27FC236}">
+                <a16:creationId xmlns:a16="http://schemas.microsoft.com/office/drawing/2014/main" id="{10F20BF9-2F22-914B-26B5-E9A76F732639}"/>
+              </a:ext>
+            </a:extLst>
+          </p:cNvPr>
+          <p:cNvSpPr txBox="1"/>
+          <p:nvPr/>
+        </p:nvSpPr>
+        <p:spPr>
+          <a:xfrm>
+            <a:off x="3047172" y="3605324"/>
+            <a:ext cx="6097656" cy="461665"/>
+          </a:xfrm>
+          <a:prstGeom prst="rect">
+            <a:avLst/>
+          </a:prstGeom>
+          <a:noFill/>
+        </p:spPr>
+        <p:txBody>
+          <a:bodyPr wrap="square">
+            <a:spAutoFit/>
+          </a:bodyPr>
+          <a:lstStyle/>
+          <a:p>
+            <a:pPr algn="ctr">
+              <a:defRPr sz="2400">
+                <a:latin typeface="標楷體"/>
+              </a:defRPr>
+            </a:pPr>
+            <a:r>
+              <a:rPr lang="zh-TW" altLang="en-US" dirty="0"/>
+              <a:t>表 </a:t>
+            </a:r>
+            <a:r>
+              <a:rPr lang="en-US" altLang="zh-TW" dirty="0"/>
+              <a:t>3-2</a:t>
+            </a:r>
+            <a:r>
+              <a:rPr lang="zh-TW" altLang="en-US" dirty="0"/>
+              <a:t>、</a:t>
+            </a:r>
+            <a:r>
+              <a:rPr lang="en-US" altLang="zh-TW" dirty="0"/>
+              <a:t>+5V </a:t>
+            </a:r>
+            <a:r>
+              <a:rPr lang="zh-TW" altLang="en-US" dirty="0"/>
+              <a:t>直流馬達時間常數</a:t>
+            </a:r>
+          </a:p>
+        </p:txBody>
+      </p:sp>
+      <p:graphicFrame>
+        <p:nvGraphicFramePr>
+          <p:cNvPr id="20" name="Table 3"/>
+          <p:cNvGraphicFramePr>
+            <a:graphicFrameLocks noGrp="1"/>
+          </p:cNvGraphicFramePr>
+          <p:nvPr>
+            <p:extLst>
+              <p:ext uri="{D42A27DB-BD31-4B8C-83A1-F6EECF244321}">
+                <p14:modId xmlns:p14="http://schemas.microsoft.com/office/powerpoint/2010/main" val="3126558884"/>
+              </p:ext>
+            </p:extLst>
+          </p:nvPr>
+        </p:nvGraphicFramePr>
+        <p:xfrm>
+          <a:off x="3614944" y="4613958"/>
+          <a:ext cx="4962112" cy="1192484"/>
+        </p:xfrm>
+        <a:graphic>
+          <a:graphicData uri="http://schemas.openxmlformats.org/drawingml/2006/table">
+            <a:tbl>
+              <a:tblPr firstRow="1" bandRow="1">
+                <a:tableStyleId>{00A15C55-8517-42AA-B614-E9B94910E393}</a:tableStyleId>
+              </a:tblPr>
+              <a:tblGrid>
+                <a:gridCol w="2481056">
+                  <a:extLst>
+                    <a:ext uri="{9D8B030D-6E8A-4147-A177-3AD203B41FA5}">
+                      <a16:colId xmlns:a16="http://schemas.microsoft.com/office/drawing/2014/main" val="20000"/>
+                    </a:ext>
+                  </a:extLst>
+                </a:gridCol>
+                <a:gridCol w="2481056">
+                  <a:extLst>
+                    <a:ext uri="{9D8B030D-6E8A-4147-A177-3AD203B41FA5}">
+                      <a16:colId xmlns:a16="http://schemas.microsoft.com/office/drawing/2014/main" val="20001"/>
+                    </a:ext>
+                  </a:extLst>
+                </a:gridCol>
+              </a:tblGrid>
+              <a:tr h="631315">
+                <a:tc>
+                  <a:txBody>
+                    <a:bodyPr/>
+                    <a:lstStyle/>
+                    <a:p>
+                      <a:pPr algn="ctr"/>
+                      <a:r>
+                        <a:rPr sz="1600" b="1" dirty="0" err="1"/>
+                        <a:t>步階響應穩態值之</a:t>
+                      </a:r>
+                      <a:r>
+                        <a:rPr sz="1600" b="1" dirty="0"/>
+                        <a:t> 0.632
+0.632*</a:t>
+                      </a:r>
+                      <a:r>
+                        <a:rPr sz="1600" b="1" dirty="0" err="1"/>
+                        <a:t>ωss</a:t>
+                      </a:r>
+                      <a:r>
+                        <a:rPr sz="1600" b="1" dirty="0"/>
+                        <a:t>(V)</a:t>
+                      </a:r>
+                      <a:endParaRPr sz="1600" b="1" dirty="0">
+                        <a:latin typeface="標楷體"/>
+                      </a:endParaRPr>
+                    </a:p>
+                  </a:txBody>
+                  <a:tcPr/>
+                </a:tc>
+                <a:tc>
+                  <a:txBody>
+                    <a:bodyPr/>
+                    <a:lstStyle/>
+                    <a:p>
+                      <a:pPr algn="ctr"/>
+                      <a:r>
+                        <a:rPr sz="1600" b="1" dirty="0" err="1"/>
+                        <a:t>直流馬達時間常數</a:t>
+                      </a:r>
+                      <a:r>
+                        <a:rPr sz="1600" b="1" dirty="0"/>
+                        <a:t>
+τ</a:t>
+                      </a:r>
+                      <a:endParaRPr sz="1600" b="1" dirty="0">
+                        <a:latin typeface="標楷體"/>
+                      </a:endParaRPr>
+                    </a:p>
+                  </a:txBody>
+                  <a:tcPr/>
+                </a:tc>
+                <a:extLst>
+                  <a:ext uri="{0D108BD9-81ED-4DB2-BD59-A6C34878D82A}">
+                    <a16:rowId xmlns:a16="http://schemas.microsoft.com/office/drawing/2014/main" val="10000"/>
+                  </a:ext>
+                </a:extLst>
+              </a:tr>
+              <a:tr h="561169">
+                <a:tc>
+                  <a:txBody>
+                    <a:bodyPr/>
+                    <a:lstStyle/>
+                    <a:p>
+                      <a:pPr algn="ctr"/>
+                      <a:r>
+                        <a:rPr lang="en-US" altLang="zh-TW" dirty="0"/>
+                        <a:t>2.717</a:t>
+                      </a:r>
+                      <a:endParaRPr dirty="0"/>
+                    </a:p>
+                  </a:txBody>
+                  <a:tcPr/>
+                </a:tc>
+                <a:tc>
+                  <a:txBody>
+                    <a:bodyPr/>
+                    <a:lstStyle/>
+                    <a:p>
+                      <a:pPr algn="ctr"/>
+                      <a:r>
+                        <a:rPr lang="en-US" altLang="zh-TW" dirty="0"/>
+                        <a:t>0.53 s</a:t>
+                      </a:r>
+                      <a:endParaRPr dirty="0"/>
+                    </a:p>
+                  </a:txBody>
+                  <a:tcPr/>
+                </a:tc>
+                <a:extLst>
+                  <a:ext uri="{0D108BD9-81ED-4DB2-BD59-A6C34878D82A}">
+                    <a16:rowId xmlns:a16="http://schemas.microsoft.com/office/drawing/2014/main" val="10001"/>
+                  </a:ext>
+                </a:extLst>
+              </a:tr>
+            </a:tbl>
+          </a:graphicData>
+        </a:graphic>
+      </p:graphicFrame>
+    </p:spTree>
+    <p:extLst>
+      <p:ext uri="{BB962C8B-B14F-4D97-AF65-F5344CB8AC3E}">
+        <p14:creationId xmlns:p14="http://schemas.microsoft.com/office/powerpoint/2010/main" val="1992170718"/>
+      </p:ext>
+    </p:extLst>
+  </p:cSld>
+  <p:clrMapOvr>
+    <a:masterClrMapping/>
+  </p:clrMapOvr>
+</p:sld>
+</file>
+
+<file path=ppt/slides/slide4.xml><?xml version="1.0" encoding="utf-8"?>
+<p:sld xmlns:a="http://schemas.openxmlformats.org/drawingml/2006/main" xmlns:r="http://schemas.openxmlformats.org/officeDocument/2006/relationships" xmlns:p="http://schemas.openxmlformats.org/presentationml/2006/main">
+  <p:cSld>
+    <p:spTree>
+      <p:nvGrpSpPr>
+        <p:cNvPr id="1" name=""/>
+        <p:cNvGrpSpPr/>
+        <p:nvPr/>
+      </p:nvGrpSpPr>
+      <p:grpSpPr>
+        <a:xfrm>
+          <a:off x="0" y="0"/>
+          <a:ext cx="0" cy="0"/>
+          <a:chOff x="0" y="0"/>
+          <a:chExt cx="0" cy="0"/>
+        </a:xfrm>
+      </p:grpSpPr>
+      <p:sp>
+        <p:nvSpPr>
+          <p:cNvPr id="3" name="TextBox 2"/>
+          <p:cNvSpPr txBox="1"/>
+          <p:nvPr/>
+        </p:nvSpPr>
+        <p:spPr>
+          <a:xfrm>
+            <a:off x="4255985" y="182881"/>
+            <a:ext cx="3877985" cy="461665"/>
+          </a:xfrm>
+          <a:prstGeom prst="rect">
+            <a:avLst/>
+          </a:prstGeom>
+          <a:noFill/>
+        </p:spPr>
+        <p:txBody>
+          <a:bodyPr wrap="none">
+            <a:spAutoFit/>
+          </a:bodyPr>
+          <a:lstStyle/>
+          <a:p>
+            <a:pPr algn="ctr">
+              <a:defRPr sz="2400">
+                <a:latin typeface="標楷體"/>
+              </a:defRPr>
+            </a:pPr>
+            <a:r>
+              <a:rPr lang="zh-TW" altLang="en-US" sz="2400" dirty="0"/>
+              <a:t>表 </a:t>
+            </a:r>
+            <a:r>
+              <a:rPr lang="en-US" altLang="zh-TW" sz="2400" dirty="0"/>
+              <a:t>3-3</a:t>
+            </a:r>
+            <a:r>
+              <a:rPr lang="zh-TW" altLang="en-US" sz="2400" dirty="0"/>
+              <a:t>、</a:t>
+            </a:r>
+            <a:r>
+              <a:rPr lang="en-US" altLang="zh-TW" sz="2400" dirty="0"/>
+              <a:t>+7V </a:t>
+            </a:r>
+            <a:r>
+              <a:rPr lang="zh-TW" altLang="en-US" sz="2400" dirty="0"/>
+              <a:t>直流馬達增益</a:t>
+            </a:r>
+          </a:p>
+        </p:txBody>
+      </p:sp>
+      <p:graphicFrame>
+        <p:nvGraphicFramePr>
+          <p:cNvPr id="4" name="Table 3"/>
+          <p:cNvGraphicFramePr>
+            <a:graphicFrameLocks noGrp="1"/>
+          </p:cNvGraphicFramePr>
+          <p:nvPr>
+            <p:extLst>
+              <p:ext uri="{D42A27DB-BD31-4B8C-83A1-F6EECF244321}">
+                <p14:modId xmlns:p14="http://schemas.microsoft.com/office/powerpoint/2010/main" val="687258956"/>
+              </p:ext>
+            </p:extLst>
+          </p:nvPr>
+        </p:nvGraphicFramePr>
+        <p:xfrm>
+          <a:off x="3244711" y="958132"/>
+          <a:ext cx="5900532" cy="1554480"/>
+        </p:xfrm>
+        <a:graphic>
+          <a:graphicData uri="http://schemas.openxmlformats.org/drawingml/2006/table">
+            <a:tbl>
+              <a:tblPr firstRow="1" bandRow="1">
+                <a:tableStyleId>{00A15C55-8517-42AA-B614-E9B94910E393}</a:tableStyleId>
+              </a:tblPr>
+              <a:tblGrid>
+                <a:gridCol w="1475133">
+                  <a:extLst>
+                    <a:ext uri="{9D8B030D-6E8A-4147-A177-3AD203B41FA5}">
+                      <a16:colId xmlns:a16="http://schemas.microsoft.com/office/drawing/2014/main" val="20000"/>
+                    </a:ext>
+                  </a:extLst>
+                </a:gridCol>
+                <a:gridCol w="1475133">
+                  <a:extLst>
+                    <a:ext uri="{9D8B030D-6E8A-4147-A177-3AD203B41FA5}">
+                      <a16:colId xmlns:a16="http://schemas.microsoft.com/office/drawing/2014/main" val="20001"/>
+                    </a:ext>
+                  </a:extLst>
+                </a:gridCol>
+                <a:gridCol w="1475133">
+                  <a:extLst>
+                    <a:ext uri="{9D8B030D-6E8A-4147-A177-3AD203B41FA5}">
+                      <a16:colId xmlns:a16="http://schemas.microsoft.com/office/drawing/2014/main" val="20002"/>
+                    </a:ext>
+                  </a:extLst>
+                </a:gridCol>
+                <a:gridCol w="1475133">
+                  <a:extLst>
+                    <a:ext uri="{9D8B030D-6E8A-4147-A177-3AD203B41FA5}">
+                      <a16:colId xmlns:a16="http://schemas.microsoft.com/office/drawing/2014/main" val="20003"/>
+                    </a:ext>
+                  </a:extLst>
+                </a:gridCol>
+              </a:tblGrid>
+              <a:tr h="731520">
+                <a:tc>
+                  <a:txBody>
+                    <a:bodyPr/>
+                    <a:lstStyle/>
+                    <a:p>
+                      <a:pPr algn="ctr"/>
+                      <a:r>
+                        <a:rPr lang="zh-TW" altLang="en-US" sz="1600" b="1" dirty="0"/>
+                        <a:t>步階輸入訊號
+</a:t>
+                      </a:r>
+                      <a:r>
+                        <a:rPr lang="en-US" altLang="zh-TW" sz="1600" b="1" dirty="0" err="1"/>
+                        <a:t>Ea</a:t>
+                      </a:r>
+                      <a:r>
+                        <a:rPr lang="en-US" altLang="zh-TW" sz="1600" b="1" dirty="0"/>
+                        <a:t>(V)</a:t>
+                      </a:r>
+                      <a:endParaRPr lang="en-US" altLang="zh-TW" sz="1600" b="1" dirty="0">
+                        <a:latin typeface="標楷體"/>
+                      </a:endParaRPr>
+                    </a:p>
+                  </a:txBody>
+                  <a:tcPr anchor="ctr"/>
+                </a:tc>
+                <a:tc>
+                  <a:txBody>
+                    <a:bodyPr/>
+                    <a:lstStyle/>
+                    <a:p>
+                      <a:pPr algn="ctr"/>
+                      <a:r>
+                        <a:rPr lang="zh-TW" altLang="en-US" sz="1600" b="1"/>
+                        <a:t>響應穩態值
+</a:t>
+                      </a:r>
+                      <a:r>
+                        <a:rPr lang="el-GR" sz="1600" b="1"/>
+                        <a:t>ω</a:t>
+                      </a:r>
+                      <a:r>
+                        <a:rPr lang="en-US" sz="1600" b="1"/>
+                        <a:t>ss(rpm)</a:t>
+                      </a:r>
+                      <a:endParaRPr lang="en-US" sz="1600" b="1">
+                        <a:latin typeface="標楷體"/>
+                      </a:endParaRPr>
+                    </a:p>
+                  </a:txBody>
+                  <a:tcPr anchor="ctr"/>
+                </a:tc>
+                <a:tc>
+                  <a:txBody>
+                    <a:bodyPr/>
+                    <a:lstStyle/>
+                    <a:p>
+                      <a:pPr algn="ctr"/>
+                      <a:r>
+                        <a:rPr lang="zh-TW" altLang="en-US" sz="1600" b="1" dirty="0"/>
+                        <a:t>響應穩態值
+</a:t>
+                      </a:r>
+                      <a:r>
+                        <a:rPr lang="el-GR" sz="1600" b="1" dirty="0"/>
+                        <a:t>ω</a:t>
+                      </a:r>
+                      <a:r>
+                        <a:rPr lang="en-US" sz="1600" b="1" dirty="0"/>
+                        <a:t>ss(V)</a:t>
+                      </a:r>
+                      <a:endParaRPr lang="en-US" sz="1600" b="1" dirty="0">
+                        <a:latin typeface="標楷體"/>
+                      </a:endParaRPr>
+                    </a:p>
+                  </a:txBody>
+                  <a:tcPr anchor="ctr"/>
+                </a:tc>
+                <a:tc>
+                  <a:txBody>
+                    <a:bodyPr/>
+                    <a:lstStyle/>
+                    <a:p>
+                      <a:pPr algn="ctr"/>
+                      <a:r>
+                        <a:rPr lang="zh-TW" altLang="en-US" sz="1600" b="1"/>
+                        <a:t>直流馬達增益
+</a:t>
+                      </a:r>
+                      <a:r>
+                        <a:rPr lang="en-US" sz="1600" b="1"/>
+                        <a:t>km=</a:t>
+                      </a:r>
+                      <a:r>
+                        <a:rPr lang="el-GR" sz="1600" b="1"/>
+                        <a:t>ω</a:t>
+                      </a:r>
+                      <a:r>
+                        <a:rPr lang="en-US" sz="1600" b="1"/>
+                        <a:t>ss(rpm)/Ea(V)</a:t>
+                      </a:r>
+                      <a:endParaRPr lang="en-US" sz="1600" b="1">
+                        <a:latin typeface="標楷體"/>
+                      </a:endParaRPr>
+                    </a:p>
+                  </a:txBody>
+                  <a:tcPr anchor="ctr"/>
+                </a:tc>
+                <a:extLst>
+                  <a:ext uri="{0D108BD9-81ED-4DB2-BD59-A6C34878D82A}">
+                    <a16:rowId xmlns:a16="http://schemas.microsoft.com/office/drawing/2014/main" val="10000"/>
+                  </a:ext>
+                </a:extLst>
+              </a:tr>
+              <a:tr h="731520">
+                <a:tc>
+                  <a:txBody>
+                    <a:bodyPr/>
+                    <a:lstStyle/>
+                    <a:p>
+                      <a:pPr algn="ctr"/>
+                      <a:r>
+                        <a:rPr lang="en-US" altLang="zh-TW" dirty="0"/>
+                        <a:t>7</a:t>
+                      </a:r>
+                      <a:endParaRPr lang="zh-TW" altLang="en-US" dirty="0"/>
+                    </a:p>
+                  </a:txBody>
+                  <a:tcPr anchor="ctr"/>
+                </a:tc>
+                <a:tc>
+                  <a:txBody>
+                    <a:bodyPr/>
+                    <a:lstStyle/>
+                    <a:p>
+                      <a:pPr algn="ctr"/>
+                      <a:r>
+                        <a:rPr lang="en-US" altLang="zh-TW" dirty="0"/>
+                        <a:t>2198.4</a:t>
+                      </a:r>
+                      <a:endParaRPr lang="zh-TW" altLang="en-US" dirty="0"/>
+                    </a:p>
+                  </a:txBody>
+                  <a:tcPr anchor="ctr"/>
+                </a:tc>
+                <a:tc>
+                  <a:txBody>
+                    <a:bodyPr/>
+                    <a:lstStyle/>
+                    <a:p>
+                      <a:pPr algn="ctr"/>
+                      <a:r>
+                        <a:rPr lang="en-US" altLang="zh-TW" dirty="0"/>
+                        <a:t>6.19</a:t>
+                      </a:r>
+                      <a:endParaRPr lang="zh-TW" altLang="en-US" dirty="0"/>
+                    </a:p>
+                  </a:txBody>
+                  <a:tcPr anchor="ctr"/>
+                </a:tc>
+                <a:tc>
+                  <a:txBody>
+                    <a:bodyPr/>
+                    <a:lstStyle/>
+                    <a:p>
+                      <a:pPr algn="ctr"/>
+                      <a:r>
+                        <a:rPr lang="en-US" altLang="zh-TW" dirty="0"/>
+                        <a:t>314.05</a:t>
+                      </a:r>
+                      <a:endParaRPr lang="zh-TW" altLang="en-US" dirty="0"/>
+                    </a:p>
+                  </a:txBody>
+                  <a:tcPr anchor="ctr"/>
+                </a:tc>
+                <a:extLst>
+                  <a:ext uri="{0D108BD9-81ED-4DB2-BD59-A6C34878D82A}">
+                    <a16:rowId xmlns:a16="http://schemas.microsoft.com/office/drawing/2014/main" val="10001"/>
+                  </a:ext>
+                </a:extLst>
+              </a:tr>
+            </a:tbl>
+          </a:graphicData>
+        </a:graphic>
+      </p:graphicFrame>
+      <p:sp>
+        <p:nvSpPr>
+          <p:cNvPr id="6" name="文字方塊 5">
+            <a:extLst>
+              <a:ext uri="{FF2B5EF4-FFF2-40B4-BE49-F238E27FC236}">
+                <a16:creationId xmlns:a16="http://schemas.microsoft.com/office/drawing/2014/main" id="{31656FB0-F12D-3EC5-5A78-5DDD95F3CDB8}"/>
+              </a:ext>
+            </a:extLst>
+          </p:cNvPr>
+          <p:cNvSpPr txBox="1"/>
+          <p:nvPr/>
+        </p:nvSpPr>
+        <p:spPr>
+          <a:xfrm>
+            <a:off x="3146149" y="3244334"/>
+            <a:ext cx="6097656" cy="461665"/>
+          </a:xfrm>
+          <a:prstGeom prst="rect">
+            <a:avLst/>
+          </a:prstGeom>
+          <a:noFill/>
+        </p:spPr>
+        <p:txBody>
+          <a:bodyPr wrap="square">
+            <a:spAutoFit/>
+          </a:bodyPr>
+          <a:lstStyle/>
+          <a:p>
+            <a:pPr algn="ctr">
+              <a:defRPr sz="2400">
+                <a:latin typeface="標楷體"/>
+              </a:defRPr>
+            </a:pPr>
+            <a:r>
+              <a:rPr lang="zh-TW" altLang="en-US" sz="2400" dirty="0"/>
+              <a:t>表 </a:t>
+            </a:r>
+            <a:r>
+              <a:rPr lang="en-US" altLang="zh-TW" sz="2400" dirty="0"/>
+              <a:t>3-4</a:t>
+            </a:r>
+            <a:r>
+              <a:rPr lang="zh-TW" altLang="en-US" sz="2400" dirty="0"/>
+              <a:t>、</a:t>
+            </a:r>
+            <a:r>
+              <a:rPr lang="en-US" altLang="zh-TW" sz="2400" dirty="0"/>
+              <a:t>+7V </a:t>
+            </a:r>
+            <a:r>
+              <a:rPr lang="zh-TW" altLang="en-US" sz="2400" dirty="0"/>
+              <a:t>直流馬達時間常數</a:t>
+            </a:r>
+          </a:p>
+        </p:txBody>
+      </p:sp>
+      <p:graphicFrame>
+        <p:nvGraphicFramePr>
+          <p:cNvPr id="7" name="表格 6">
+            <a:extLst>
+              <a:ext uri="{FF2B5EF4-FFF2-40B4-BE49-F238E27FC236}">
+                <a16:creationId xmlns:a16="http://schemas.microsoft.com/office/drawing/2014/main" id="{A0DDE00D-71A9-7105-144B-895B95D24A3A}"/>
+              </a:ext>
+            </a:extLst>
+          </p:cNvPr>
+          <p:cNvGraphicFramePr>
+            <a:graphicFrameLocks noGrp="1"/>
+          </p:cNvGraphicFramePr>
+          <p:nvPr>
+            <p:extLst>
+              <p:ext uri="{D42A27DB-BD31-4B8C-83A1-F6EECF244321}">
+                <p14:modId xmlns:p14="http://schemas.microsoft.com/office/powerpoint/2010/main" val="1656156176"/>
+              </p:ext>
+            </p:extLst>
+          </p:nvPr>
+        </p:nvGraphicFramePr>
+        <p:xfrm>
+          <a:off x="3655529" y="4032112"/>
+          <a:ext cx="5078896" cy="1463040"/>
+        </p:xfrm>
+        <a:graphic>
+          <a:graphicData uri="http://schemas.openxmlformats.org/drawingml/2006/table">
+            <a:tbl>
+              <a:tblPr firstRow="1" bandRow="1">
+                <a:tableStyleId>{00A15C55-8517-42AA-B614-E9B94910E393}</a:tableStyleId>
+              </a:tblPr>
+              <a:tblGrid>
+                <a:gridCol w="2539448">
+                  <a:extLst>
+                    <a:ext uri="{9D8B030D-6E8A-4147-A177-3AD203B41FA5}">
+                      <a16:colId xmlns:a16="http://schemas.microsoft.com/office/drawing/2014/main" val="3481748063"/>
+                    </a:ext>
+                  </a:extLst>
+                </a:gridCol>
+                <a:gridCol w="2539448">
+                  <a:extLst>
+                    <a:ext uri="{9D8B030D-6E8A-4147-A177-3AD203B41FA5}">
+                      <a16:colId xmlns:a16="http://schemas.microsoft.com/office/drawing/2014/main" val="644447967"/>
+                    </a:ext>
+                  </a:extLst>
+                </a:gridCol>
+              </a:tblGrid>
+              <a:tr h="731520">
+                <a:tc>
+                  <a:txBody>
+                    <a:bodyPr/>
+                    <a:lstStyle/>
+                    <a:p>
+                      <a:pPr algn="ctr"/>
+                      <a:r>
+                        <a:rPr sz="1600" b="1" dirty="0" err="1"/>
+                        <a:t>步階響應穩態值之</a:t>
+                      </a:r>
+                      <a:r>
+                        <a:rPr sz="1600" b="1" dirty="0"/>
+                        <a:t> 0.632
+0.632*</a:t>
+                      </a:r>
+                      <a:r>
+                        <a:rPr sz="1600" b="1" dirty="0" err="1"/>
+                        <a:t>ωss</a:t>
+                      </a:r>
+                      <a:r>
+                        <a:rPr sz="1600" b="1" dirty="0"/>
+                        <a:t>(V)</a:t>
+                      </a:r>
+                      <a:endParaRPr sz="1600" b="1" dirty="0">
+                        <a:latin typeface="標楷體"/>
+                      </a:endParaRPr>
+                    </a:p>
+                  </a:txBody>
+                  <a:tcPr anchor="ctr"/>
+                </a:tc>
+                <a:tc>
+                  <a:txBody>
+                    <a:bodyPr/>
+                    <a:lstStyle/>
+                    <a:p>
+                      <a:pPr algn="ctr"/>
+                      <a:r>
+                        <a:rPr sz="1600" b="1" dirty="0" err="1"/>
+                        <a:t>直流馬達時間常數</a:t>
+                      </a:r>
+                      <a:r>
+                        <a:rPr sz="1600" b="1" dirty="0"/>
+                        <a:t>
+τ</a:t>
+                      </a:r>
+                      <a:endParaRPr sz="1600" b="1" dirty="0">
+                        <a:latin typeface="標楷體"/>
+                      </a:endParaRPr>
+                    </a:p>
+                  </a:txBody>
+                  <a:tcPr anchor="ctr"/>
+                </a:tc>
+                <a:extLst>
+                  <a:ext uri="{0D108BD9-81ED-4DB2-BD59-A6C34878D82A}">
+                    <a16:rowId xmlns:a16="http://schemas.microsoft.com/office/drawing/2014/main" val="2745502917"/>
+                  </a:ext>
+                </a:extLst>
+              </a:tr>
+              <a:tr h="731520">
+                <a:tc>
+                  <a:txBody>
+                    <a:bodyPr/>
+                    <a:lstStyle/>
+                    <a:p>
+                      <a:pPr algn="ctr"/>
+                      <a:r>
+                        <a:rPr lang="en-US" altLang="zh-TW" dirty="0"/>
+                        <a:t>3.91</a:t>
+                      </a:r>
+                      <a:endParaRPr dirty="0"/>
+                    </a:p>
+                  </a:txBody>
+                  <a:tcPr anchor="ctr"/>
+                </a:tc>
+                <a:tc>
+                  <a:txBody>
+                    <a:bodyPr/>
+                    <a:lstStyle/>
+                    <a:p>
+                      <a:pPr algn="ctr"/>
+                      <a:r>
+                        <a:rPr lang="en-US" altLang="zh-TW" dirty="0"/>
+                        <a:t>0.49</a:t>
+                      </a:r>
+                      <a:r>
+                        <a:rPr lang="zh-TW" altLang="en-US" dirty="0"/>
+                        <a:t> </a:t>
+                      </a:r>
+                      <a:r>
+                        <a:rPr lang="en-US" altLang="zh-TW" dirty="0"/>
+                        <a:t>s</a:t>
+                      </a:r>
+                      <a:endParaRPr dirty="0"/>
+                    </a:p>
+                  </a:txBody>
+                  <a:tcPr anchor="ctr"/>
+                </a:tc>
+                <a:extLst>
+                  <a:ext uri="{0D108BD9-81ED-4DB2-BD59-A6C34878D82A}">
+                    <a16:rowId xmlns:a16="http://schemas.microsoft.com/office/drawing/2014/main" val="2566265455"/>
+                  </a:ext>
+                </a:extLst>
+              </a:tr>
+            </a:tbl>
+          </a:graphicData>
+        </a:graphic>
+      </p:graphicFrame>
+    </p:spTree>
+  </p:cSld>
+  <p:clrMapOvr>
+    <a:masterClrMapping/>
+  </p:clrMapOvr>
+</p:sld>
+</file>
+
+<file path=ppt/slides/slide5.xml><?xml version="1.0" encoding="utf-8"?>
+<p:sld xmlns:a="http://schemas.openxmlformats.org/drawingml/2006/main" xmlns:r="http://schemas.openxmlformats.org/officeDocument/2006/relationships" xmlns:p="http://schemas.openxmlformats.org/presentationml/2006/main">
+  <p:cSld>
+    <p:spTree>
+      <p:nvGrpSpPr>
+        <p:cNvPr id="1" name=""/>
+        <p:cNvGrpSpPr/>
+        <p:nvPr/>
+      </p:nvGrpSpPr>
+      <p:grpSpPr>
+        <a:xfrm>
+          <a:off x="0" y="0"/>
+          <a:ext cx="0" cy="0"/>
+          <a:chOff x="0" y="0"/>
+          <a:chExt cx="0" cy="0"/>
+        </a:xfrm>
+      </p:grpSpPr>
+      <p:sp>
+        <p:nvSpPr>
+          <p:cNvPr id="2" name="標題 1"/>
+          <p:cNvSpPr>
+            <a:spLocks noGrp="1"/>
+          </p:cNvSpPr>
+          <p:nvPr>
+            <p:ph type="title"/>
+          </p:nvPr>
+        </p:nvSpPr>
+        <p:spPr/>
+        <p:txBody>
+          <a:bodyPr/>
+          <a:lstStyle/>
+          <a:p>
+            <a:r>
+              <a:rPr lang="zh-TW" altLang="en-US" dirty="0">
                 <a:latin typeface="標楷體" panose="03000509000000000000" pitchFamily="65" charset="-120"/>
                 <a:ea typeface="標楷體" panose="03000509000000000000" pitchFamily="65" charset="-120"/>
               </a:rPr>
               <a:t>實驗</a:t>
             </a:r>
             <a:r>
-              <a:rPr lang="en-US" altLang="zh-TW" dirty="0" smtClean="0">
+              <a:rPr lang="en-US" altLang="zh-TW" dirty="0">
                 <a:latin typeface="標楷體" panose="03000509000000000000" pitchFamily="65" charset="-120"/>
                 <a:ea typeface="標楷體" panose="03000509000000000000" pitchFamily="65" charset="-120"/>
               </a:rPr>
-              <a:t>2-1</a:t>
+              <a:t>3-1</a:t>
             </a:r>
             <a:endParaRPr lang="zh-TW" altLang="en-US" dirty="0">
               <a:latin typeface="標楷體" panose="03000509000000000000" pitchFamily="65" charset="-120"/>
@@ -4732,8 +8107,8 @@
           </a:prstGeom>
         </p:spPr>
       </p:pic>
-      <mc:AlternateContent xmlns:mc="http://schemas.openxmlformats.org/markup-compatibility/2006">
-        <mc:Choice xmlns:a14="http://schemas.microsoft.com/office/drawing/2010/main" Requires="a14">
+      <mc:AlternateContent xmlns:mc="http://schemas.openxmlformats.org/markup-compatibility/2006" xmlns:a14="http://schemas.microsoft.com/office/drawing/2010/main">
+        <mc:Choice Requires="a14">
           <p:sp>
             <p:nvSpPr>
               <p:cNvPr id="4" name="文字方塊 3"/>
@@ -4917,11 +8292,11 @@
                   </m:oMath>
                 </a14:m>
                 <a:r>
-                  <a:rPr lang="zh-TW" altLang="en-US" sz="2800" dirty="0" smtClean="0"/>
+                  <a:rPr lang="zh-TW" altLang="en-US" sz="2800" dirty="0"/>
                   <a:t>  </a:t>
                 </a:r>
                 <a:r>
-                  <a:rPr lang="en-US" altLang="zh-TW" sz="2800" dirty="0" smtClean="0"/>
+                  <a:rPr lang="en-US" altLang="zh-TW" sz="2800" dirty="0"/>
                   <a:t>by equation 3-4</a:t>
                 </a:r>
                 <a:endParaRPr lang="zh-TW" altLang="en-US" sz="2800" dirty="0"/>
@@ -4929,7 +8304,7 @@
             </p:txBody>
           </p:sp>
         </mc:Choice>
-        <mc:Fallback>
+        <mc:Fallback xmlns="">
           <p:sp>
             <p:nvSpPr>
               <p:cNvPr id="4" name="文字方塊 3"/>
@@ -4981,7 +8356,7 @@
 </p:sld>
 </file>
 
-<file path=ppt/slides/slide4.xml><?xml version="1.0" encoding="utf-8"?>
+<file path=ppt/slides/slide6.xml><?xml version="1.0" encoding="utf-8"?>
 <p:sld xmlns:a="http://schemas.openxmlformats.org/drawingml/2006/main" xmlns:r="http://schemas.openxmlformats.org/officeDocument/2006/relationships" xmlns:p="http://schemas.openxmlformats.org/presentationml/2006/main">
   <p:cSld>
     <p:spTree>
@@ -5014,18 +8389,18 @@
           <a:lstStyle/>
           <a:p>
             <a:r>
-              <a:rPr lang="zh-TW" altLang="en-US" dirty="0" smtClean="0">
+              <a:rPr lang="zh-TW" altLang="en-US" dirty="0">
                 <a:latin typeface="標楷體" panose="03000509000000000000" pitchFamily="65" charset="-120"/>
                 <a:ea typeface="標楷體" panose="03000509000000000000" pitchFamily="65" charset="-120"/>
               </a:rPr>
               <a:t>實驗</a:t>
             </a:r>
             <a:r>
-              <a:rPr lang="en-US" altLang="zh-TW" dirty="0" smtClean="0">
+              <a:rPr lang="en-US" altLang="zh-TW" dirty="0">
                 <a:latin typeface="標楷體" panose="03000509000000000000" pitchFamily="65" charset="-120"/>
                 <a:ea typeface="標楷體" panose="03000509000000000000" pitchFamily="65" charset="-120"/>
               </a:rPr>
-              <a:t>2-1(5V)</a:t>
+              <a:t>3-1(5V)</a:t>
             </a:r>
             <a:endParaRPr lang="zh-TW" altLang="en-US" dirty="0">
               <a:latin typeface="標楷體" panose="03000509000000000000" pitchFamily="65" charset="-120"/>
@@ -5161,7 +8536,7 @@
 </p:sld>
 </file>
 
-<file path=ppt/slides/slide5.xml><?xml version="1.0" encoding="utf-8"?>
+<file path=ppt/slides/slide7.xml><?xml version="1.0" encoding="utf-8"?>
 <p:sld xmlns:a="http://schemas.openxmlformats.org/drawingml/2006/main" xmlns:r="http://schemas.openxmlformats.org/officeDocument/2006/relationships" xmlns:p="http://schemas.openxmlformats.org/presentationml/2006/main">
   <p:cSld>
     <p:spTree>
@@ -5194,18 +8569,18 @@
           <a:lstStyle/>
           <a:p>
             <a:r>
-              <a:rPr lang="zh-TW" altLang="en-US" dirty="0" smtClean="0">
+              <a:rPr lang="zh-TW" altLang="en-US" dirty="0">
                 <a:latin typeface="標楷體" panose="03000509000000000000" pitchFamily="65" charset="-120"/>
                 <a:ea typeface="標楷體" panose="03000509000000000000" pitchFamily="65" charset="-120"/>
               </a:rPr>
               <a:t>實驗</a:t>
             </a:r>
             <a:r>
-              <a:rPr lang="en-US" altLang="zh-TW" dirty="0" smtClean="0">
+              <a:rPr lang="en-US" altLang="zh-TW" dirty="0">
                 <a:latin typeface="標楷體" panose="03000509000000000000" pitchFamily="65" charset="-120"/>
                 <a:ea typeface="標楷體" panose="03000509000000000000" pitchFamily="65" charset="-120"/>
               </a:rPr>
-              <a:t>2-1(7V)</a:t>
+              <a:t>3-1(7V)</a:t>
             </a:r>
             <a:endParaRPr lang="zh-TW" altLang="en-US" dirty="0">
               <a:latin typeface="標楷體" panose="03000509000000000000" pitchFamily="65" charset="-120"/>
@@ -5341,7 +8716,7 @@
 </p:sld>
 </file>
 
-<file path=ppt/slides/slide6.xml><?xml version="1.0" encoding="utf-8"?>
+<file path=ppt/slides/slide8.xml><?xml version="1.0" encoding="utf-8"?>
 <p:sld xmlns:a="http://schemas.openxmlformats.org/drawingml/2006/main" xmlns:r="http://schemas.openxmlformats.org/officeDocument/2006/relationships" xmlns:p="http://schemas.openxmlformats.org/presentationml/2006/main">
   <p:cSld>
     <p:spTree>
@@ -5374,18 +8749,18 @@
           <a:lstStyle/>
           <a:p>
             <a:r>
-              <a:rPr lang="zh-TW" altLang="en-US" dirty="0" smtClean="0">
+              <a:rPr lang="zh-TW" altLang="en-US" dirty="0">
                 <a:latin typeface="標楷體" panose="03000509000000000000" pitchFamily="65" charset="-120"/>
                 <a:ea typeface="標楷體" panose="03000509000000000000" pitchFamily="65" charset="-120"/>
               </a:rPr>
               <a:t>實驗</a:t>
             </a:r>
             <a:r>
-              <a:rPr lang="en-US" altLang="zh-TW" dirty="0" smtClean="0">
+              <a:rPr lang="en-US" altLang="zh-TW" dirty="0">
                 <a:latin typeface="標楷體" panose="03000509000000000000" pitchFamily="65" charset="-120"/>
                 <a:ea typeface="標楷體" panose="03000509000000000000" pitchFamily="65" charset="-120"/>
               </a:rPr>
-              <a:t>2-2</a:t>
+              <a:t>3-2</a:t>
             </a:r>
             <a:endParaRPr lang="zh-TW" altLang="en-US" dirty="0">
               <a:latin typeface="標楷體" panose="03000509000000000000" pitchFamily="65" charset="-120"/>
@@ -5418,8 +8793,8 @@
           </a:prstGeom>
         </p:spPr>
       </p:pic>
-      <mc:AlternateContent xmlns:mc="http://schemas.openxmlformats.org/markup-compatibility/2006">
-        <mc:Choice xmlns:a14="http://schemas.microsoft.com/office/drawing/2010/main" Requires="a14">
+      <mc:AlternateContent xmlns:mc="http://schemas.openxmlformats.org/markup-compatibility/2006" xmlns:a14="http://schemas.microsoft.com/office/drawing/2010/main">
+        <mc:Choice Requires="a14">
           <p:sp>
             <p:nvSpPr>
               <p:cNvPr id="8" name="文字方塊 7"/>
@@ -5442,6 +8817,7 @@
               </a:bodyPr>
               <a:lstStyle/>
               <a:p>
+                <a:pPr/>
                 <a14:m>
                   <m:oMathPara xmlns:m="http://schemas.openxmlformats.org/officeDocument/2006/math">
                     <m:oMathParaPr>
@@ -5590,9 +8966,10 @@
                     </m:oMath>
                   </m:oMathPara>
                 </a14:m>
-                <a:endParaRPr lang="en-US" altLang="zh-TW" b="0" dirty="0" smtClean="0"/>
+                <a:endParaRPr lang="en-US" altLang="zh-TW" b="0" dirty="0"/>
               </a:p>
               <a:p>
+                <a:pPr/>
                 <a14:m>
                   <m:oMathPara xmlns:m="http://schemas.openxmlformats.org/officeDocument/2006/math">
                     <m:oMathParaPr>
@@ -5715,9 +9092,10 @@
                     </m:oMath>
                   </m:oMathPara>
                 </a14:m>
-                <a:endParaRPr lang="en-US" altLang="zh-TW" b="0" dirty="0" smtClean="0"/>
+                <a:endParaRPr lang="en-US" altLang="zh-TW" b="0" dirty="0"/>
               </a:p>
               <a:p>
+                <a:pPr/>
                 <a14:m>
                   <m:oMathPara xmlns:m="http://schemas.openxmlformats.org/officeDocument/2006/math">
                     <m:oMathParaPr>
@@ -5989,7 +9367,7 @@
             </p:txBody>
           </p:sp>
         </mc:Choice>
-        <mc:Fallback>
+        <mc:Fallback xmlns="">
           <p:sp>
             <p:nvSpPr>
               <p:cNvPr id="8" name="文字方塊 7"/>
@@ -6041,7 +9419,7 @@
 </p:sld>
 </file>
 
-<file path=ppt/slides/slide7.xml><?xml version="1.0" encoding="utf-8"?>
+<file path=ppt/slides/slide9.xml><?xml version="1.0" encoding="utf-8"?>
 <p:sld xmlns:a="http://schemas.openxmlformats.org/drawingml/2006/main" xmlns:r="http://schemas.openxmlformats.org/officeDocument/2006/relationships" xmlns:p="http://schemas.openxmlformats.org/presentationml/2006/main">
   <p:cSld>
     <p:spTree>
@@ -6074,18 +9452,18 @@
           <a:lstStyle/>
           <a:p>
             <a:r>
-              <a:rPr lang="zh-TW" altLang="en-US" dirty="0" smtClean="0">
+              <a:rPr lang="zh-TW" altLang="en-US" dirty="0">
                 <a:latin typeface="標楷體" panose="03000509000000000000" pitchFamily="65" charset="-120"/>
                 <a:ea typeface="標楷體" panose="03000509000000000000" pitchFamily="65" charset="-120"/>
               </a:rPr>
               <a:t>實驗</a:t>
             </a:r>
             <a:r>
-              <a:rPr lang="en-US" altLang="zh-TW" dirty="0" smtClean="0">
+              <a:rPr lang="en-US" altLang="zh-TW" dirty="0">
                 <a:latin typeface="標楷體" panose="03000509000000000000" pitchFamily="65" charset="-120"/>
                 <a:ea typeface="標楷體" panose="03000509000000000000" pitchFamily="65" charset="-120"/>
               </a:rPr>
-              <a:t>2-2</a:t>
+              <a:t>3-2</a:t>
             </a:r>
             <a:endParaRPr lang="zh-TW" altLang="en-US" dirty="0">
               <a:latin typeface="標楷體" panose="03000509000000000000" pitchFamily="65" charset="-120"/>
@@ -6146,366 +9524,6 @@
     <p:extLst>
       <p:ext uri="{BB962C8B-B14F-4D97-AF65-F5344CB8AC3E}">
         <p14:creationId xmlns:p14="http://schemas.microsoft.com/office/powerpoint/2010/main" val="1344071708"/>
-      </p:ext>
-    </p:extLst>
-  </p:cSld>
-  <p:clrMapOvr>
-    <a:masterClrMapping/>
-  </p:clrMapOvr>
-</p:sld>
-</file>
-
-<file path=ppt/slides/slide8.xml><?xml version="1.0" encoding="utf-8"?>
-<p:sld xmlns:a="http://schemas.openxmlformats.org/drawingml/2006/main" xmlns:r="http://schemas.openxmlformats.org/officeDocument/2006/relationships" xmlns:p="http://schemas.openxmlformats.org/presentationml/2006/main">
-  <p:cSld>
-    <p:spTree>
-      <p:nvGrpSpPr>
-        <p:cNvPr id="1" name=""/>
-        <p:cNvGrpSpPr/>
-        <p:nvPr/>
-      </p:nvGrpSpPr>
-      <p:grpSpPr>
-        <a:xfrm>
-          <a:off x="0" y="0"/>
-          <a:ext cx="0" cy="0"/>
-          <a:chOff x="0" y="0"/>
-          <a:chExt cx="0" cy="0"/>
-        </a:xfrm>
-      </p:grpSpPr>
-      <p:sp>
-        <p:nvSpPr>
-          <p:cNvPr id="2" name="標題 1"/>
-          <p:cNvSpPr>
-            <a:spLocks noGrp="1"/>
-          </p:cNvSpPr>
-          <p:nvPr>
-            <p:ph type="title"/>
-          </p:nvPr>
-        </p:nvSpPr>
-        <p:spPr/>
-        <p:txBody>
-          <a:bodyPr/>
-          <a:lstStyle/>
-          <a:p>
-            <a:r>
-              <a:rPr lang="zh-TW" altLang="en-US" dirty="0" smtClean="0">
-                <a:latin typeface="標楷體" panose="03000509000000000000" pitchFamily="65" charset="-120"/>
-                <a:ea typeface="標楷體" panose="03000509000000000000" pitchFamily="65" charset="-120"/>
-              </a:rPr>
-              <a:t>實驗</a:t>
-            </a:r>
-            <a:r>
-              <a:rPr lang="en-US" altLang="zh-TW" dirty="0" smtClean="0">
-                <a:latin typeface="標楷體" panose="03000509000000000000" pitchFamily="65" charset="-120"/>
-                <a:ea typeface="標楷體" panose="03000509000000000000" pitchFamily="65" charset="-120"/>
-              </a:rPr>
-              <a:t>2-2</a:t>
-            </a:r>
-            <a:endParaRPr lang="zh-TW" altLang="en-US" dirty="0">
-              <a:latin typeface="標楷體" panose="03000509000000000000" pitchFamily="65" charset="-120"/>
-              <a:ea typeface="標楷體" panose="03000509000000000000" pitchFamily="65" charset="-120"/>
-            </a:endParaRPr>
-          </a:p>
-        </p:txBody>
-      </p:sp>
-      <p:pic>
-        <p:nvPicPr>
-          <p:cNvPr id="3" name="圖片 2"/>
-          <p:cNvPicPr>
-            <a:picLocks noChangeAspect="1"/>
-          </p:cNvPicPr>
-          <p:nvPr/>
-        </p:nvPicPr>
-        <p:blipFill>
-          <a:blip r:embed="rId2"/>
-          <a:stretch>
-            <a:fillRect/>
-          </a:stretch>
-        </p:blipFill>
-        <p:spPr>
-          <a:xfrm>
-            <a:off x="838200" y="1553827"/>
-            <a:ext cx="10702840" cy="737753"/>
-          </a:xfrm>
-          <a:prstGeom prst="rect">
-            <a:avLst/>
-          </a:prstGeom>
-        </p:spPr>
-      </p:pic>
-      <p:pic>
-        <p:nvPicPr>
-          <p:cNvPr id="4" name="圖片 3"/>
-          <p:cNvPicPr>
-            <a:picLocks noChangeAspect="1"/>
-          </p:cNvPicPr>
-          <p:nvPr/>
-        </p:nvPicPr>
-        <p:blipFill>
-          <a:blip r:embed="rId3" cstate="print">
-            <a:extLst>
-              <a:ext uri="{28A0092B-C50C-407E-A947-70E740481C1C}">
-                <a14:useLocalDpi xmlns:a14="http://schemas.microsoft.com/office/drawing/2010/main" val="0"/>
-              </a:ext>
-            </a:extLst>
-          </a:blip>
-          <a:stretch>
-            <a:fillRect/>
-          </a:stretch>
-        </p:blipFill>
-        <p:spPr>
-          <a:xfrm>
-            <a:off x="1421318" y="3180282"/>
-            <a:ext cx="3135429" cy="2887579"/>
-          </a:xfrm>
-          <a:prstGeom prst="rect">
-            <a:avLst/>
-          </a:prstGeom>
-        </p:spPr>
-      </p:pic>
-      <p:pic>
-        <p:nvPicPr>
-          <p:cNvPr id="5" name="圖片 4"/>
-          <p:cNvPicPr>
-            <a:picLocks noChangeAspect="1"/>
-          </p:cNvPicPr>
-          <p:nvPr/>
-        </p:nvPicPr>
-        <p:blipFill>
-          <a:blip r:embed="rId4" cstate="print">
-            <a:extLst>
-              <a:ext uri="{28A0092B-C50C-407E-A947-70E740481C1C}">
-                <a14:useLocalDpi xmlns:a14="http://schemas.microsoft.com/office/drawing/2010/main" val="0"/>
-              </a:ext>
-            </a:extLst>
-          </a:blip>
-          <a:stretch>
-            <a:fillRect/>
-          </a:stretch>
-        </p:blipFill>
-        <p:spPr>
-          <a:xfrm>
-            <a:off x="8405611" y="3180282"/>
-            <a:ext cx="3135429" cy="2887579"/>
-          </a:xfrm>
-          <a:prstGeom prst="rect">
-            <a:avLst/>
-          </a:prstGeom>
-        </p:spPr>
-      </p:pic>
-      <p:pic>
-        <p:nvPicPr>
-          <p:cNvPr id="6" name="圖片 5"/>
-          <p:cNvPicPr>
-            <a:picLocks noChangeAspect="1"/>
-          </p:cNvPicPr>
-          <p:nvPr/>
-        </p:nvPicPr>
-        <p:blipFill>
-          <a:blip r:embed="rId5" cstate="print">
-            <a:extLst>
-              <a:ext uri="{28A0092B-C50C-407E-A947-70E740481C1C}">
-                <a14:useLocalDpi xmlns:a14="http://schemas.microsoft.com/office/drawing/2010/main" val="0"/>
-              </a:ext>
-            </a:extLst>
-          </a:blip>
-          <a:stretch>
-            <a:fillRect/>
-          </a:stretch>
-        </p:blipFill>
-        <p:spPr>
-          <a:xfrm>
-            <a:off x="4969826" y="3180282"/>
-            <a:ext cx="3135429" cy="2887579"/>
-          </a:xfrm>
-          <a:prstGeom prst="rect">
-            <a:avLst/>
-          </a:prstGeom>
-        </p:spPr>
-      </p:pic>
-    </p:spTree>
-    <p:extLst>
-      <p:ext uri="{BB962C8B-B14F-4D97-AF65-F5344CB8AC3E}">
-        <p14:creationId xmlns:p14="http://schemas.microsoft.com/office/powerpoint/2010/main" val="1966546450"/>
-      </p:ext>
-    </p:extLst>
-  </p:cSld>
-  <p:clrMapOvr>
-    <a:masterClrMapping/>
-  </p:clrMapOvr>
-</p:sld>
-</file>
-
-<file path=ppt/slides/slide9.xml><?xml version="1.0" encoding="utf-8"?>
-<p:sld xmlns:a="http://schemas.openxmlformats.org/drawingml/2006/main" xmlns:r="http://schemas.openxmlformats.org/officeDocument/2006/relationships" xmlns:p="http://schemas.openxmlformats.org/presentationml/2006/main">
-  <p:cSld>
-    <p:spTree>
-      <p:nvGrpSpPr>
-        <p:cNvPr id="1" name=""/>
-        <p:cNvGrpSpPr/>
-        <p:nvPr/>
-      </p:nvGrpSpPr>
-      <p:grpSpPr>
-        <a:xfrm>
-          <a:off x="0" y="0"/>
-          <a:ext cx="0" cy="0"/>
-          <a:chOff x="0" y="0"/>
-          <a:chExt cx="0" cy="0"/>
-        </a:xfrm>
-      </p:grpSpPr>
-      <p:sp>
-        <p:nvSpPr>
-          <p:cNvPr id="2" name="標題 1"/>
-          <p:cNvSpPr>
-            <a:spLocks noGrp="1"/>
-          </p:cNvSpPr>
-          <p:nvPr>
-            <p:ph type="title"/>
-          </p:nvPr>
-        </p:nvSpPr>
-        <p:spPr/>
-        <p:txBody>
-          <a:bodyPr/>
-          <a:lstStyle/>
-          <a:p>
-            <a:r>
-              <a:rPr lang="zh-TW" altLang="en-US" dirty="0" smtClean="0">
-                <a:latin typeface="標楷體" panose="03000509000000000000" pitchFamily="65" charset="-120"/>
-                <a:ea typeface="標楷體" panose="03000509000000000000" pitchFamily="65" charset="-120"/>
-              </a:rPr>
-              <a:t>實驗</a:t>
-            </a:r>
-            <a:r>
-              <a:rPr lang="en-US" altLang="zh-TW" dirty="0" smtClean="0">
-                <a:latin typeface="標楷體" panose="03000509000000000000" pitchFamily="65" charset="-120"/>
-                <a:ea typeface="標楷體" panose="03000509000000000000" pitchFamily="65" charset="-120"/>
-              </a:rPr>
-              <a:t>2-2</a:t>
-            </a:r>
-            <a:endParaRPr lang="zh-TW" altLang="en-US" dirty="0">
-              <a:latin typeface="標楷體" panose="03000509000000000000" pitchFamily="65" charset="-120"/>
-              <a:ea typeface="標楷體" panose="03000509000000000000" pitchFamily="65" charset="-120"/>
-            </a:endParaRPr>
-          </a:p>
-        </p:txBody>
-      </p:sp>
-      <p:pic>
-        <p:nvPicPr>
-          <p:cNvPr id="4" name="圖片 3"/>
-          <p:cNvPicPr>
-            <a:picLocks noChangeAspect="1"/>
-          </p:cNvPicPr>
-          <p:nvPr/>
-        </p:nvPicPr>
-        <p:blipFill>
-          <a:blip r:embed="rId2"/>
-          <a:stretch>
-            <a:fillRect/>
-          </a:stretch>
-        </p:blipFill>
-        <p:spPr>
-          <a:xfrm>
-            <a:off x="882277" y="1690688"/>
-            <a:ext cx="10710351" cy="847269"/>
-          </a:xfrm>
-          <a:prstGeom prst="rect">
-            <a:avLst/>
-          </a:prstGeom>
-        </p:spPr>
-      </p:pic>
-      <p:pic>
-        <p:nvPicPr>
-          <p:cNvPr id="5" name="圖片 4"/>
-          <p:cNvPicPr>
-            <a:picLocks noChangeAspect="1"/>
-          </p:cNvPicPr>
-          <p:nvPr/>
-        </p:nvPicPr>
-        <p:blipFill>
-          <a:blip r:embed="rId3" cstate="print">
-            <a:extLst>
-              <a:ext uri="{28A0092B-C50C-407E-A947-70E740481C1C}">
-                <a14:useLocalDpi xmlns:a14="http://schemas.microsoft.com/office/drawing/2010/main" val="0"/>
-              </a:ext>
-            </a:extLst>
-          </a:blip>
-          <a:stretch>
-            <a:fillRect/>
-          </a:stretch>
-        </p:blipFill>
-        <p:spPr>
-          <a:xfrm>
-            <a:off x="644787" y="2799373"/>
-            <a:ext cx="3650667" cy="3362088"/>
-          </a:xfrm>
-          <a:prstGeom prst="rect">
-            <a:avLst/>
-          </a:prstGeom>
-        </p:spPr>
-      </p:pic>
-      <p:pic>
-        <p:nvPicPr>
-          <p:cNvPr id="6" name="圖片 5"/>
-          <p:cNvPicPr>
-            <a:picLocks noChangeAspect="1"/>
-          </p:cNvPicPr>
-          <p:nvPr/>
-        </p:nvPicPr>
-        <p:blipFill>
-          <a:blip r:embed="rId4" cstate="print">
-            <a:extLst>
-              <a:ext uri="{28A0092B-C50C-407E-A947-70E740481C1C}">
-                <a14:useLocalDpi xmlns:a14="http://schemas.microsoft.com/office/drawing/2010/main" val="0"/>
-              </a:ext>
-            </a:extLst>
-          </a:blip>
-          <a:stretch>
-            <a:fillRect/>
-          </a:stretch>
-        </p:blipFill>
-        <p:spPr>
-          <a:xfrm>
-            <a:off x="8328365" y="2799373"/>
-            <a:ext cx="3650667" cy="3362088"/>
-          </a:xfrm>
-          <a:prstGeom prst="rect">
-            <a:avLst/>
-          </a:prstGeom>
-        </p:spPr>
-      </p:pic>
-      <p:pic>
-        <p:nvPicPr>
-          <p:cNvPr id="7" name="圖片 6"/>
-          <p:cNvPicPr>
-            <a:picLocks noChangeAspect="1"/>
-          </p:cNvPicPr>
-          <p:nvPr/>
-        </p:nvPicPr>
-        <p:blipFill>
-          <a:blip r:embed="rId5" cstate="print">
-            <a:extLst>
-              <a:ext uri="{28A0092B-C50C-407E-A947-70E740481C1C}">
-                <a14:useLocalDpi xmlns:a14="http://schemas.microsoft.com/office/drawing/2010/main" val="0"/>
-              </a:ext>
-            </a:extLst>
-          </a:blip>
-          <a:stretch>
-            <a:fillRect/>
-          </a:stretch>
-        </p:blipFill>
-        <p:spPr>
-          <a:xfrm>
-            <a:off x="4486576" y="2799373"/>
-            <a:ext cx="3650667" cy="3362088"/>
-          </a:xfrm>
-          <a:prstGeom prst="rect">
-            <a:avLst/>
-          </a:prstGeom>
-        </p:spPr>
-      </p:pic>
-    </p:spTree>
-    <p:extLst>
-      <p:ext uri="{BB962C8B-B14F-4D97-AF65-F5344CB8AC3E}">
-        <p14:creationId xmlns:p14="http://schemas.microsoft.com/office/powerpoint/2010/main" val="248448261"/>
       </p:ext>
     </p:extLst>
   </p:cSld>

</xml_diff>